<commit_message>
[chapter6] Added pyBullet validation; described experimental setup
</commit_message>
<xml_diff>
--- a/img/pptGraphs.pptx
+++ b/img/pptGraphs.pptx
@@ -7,6 +7,7 @@
   <p:sldIdLst>
     <p:sldId id="256" r:id="rId2"/>
     <p:sldId id="257" r:id="rId3"/>
+    <p:sldId id="258" r:id="rId4"/>
   </p:sldIdLst>
   <p:sldSz cx="12192000" cy="6858000"/>
   <p:notesSz cx="6858000" cy="9144000"/>
@@ -900,13 +901,8 @@
           </a:r>
           <a:r>
             <a:rPr lang="de-DE" dirty="0"/>
-            <a:t> </a:t>
+            <a:t> Planning</a:t>
           </a:r>
-          <a:r>
-            <a:rPr lang="de-DE" dirty="0" err="1"/>
-            <a:t>Planning</a:t>
-          </a:r>
-          <a:endParaRPr lang="de-DE" dirty="0"/>
         </a:p>
       </dgm:t>
     </dgm:pt>
@@ -1070,12 +1066,8 @@
         <a:lstStyle/>
         <a:p>
           <a:r>
-            <a:rPr lang="de-DE" dirty="0" err="1"/>
-            <a:t>Actuator</a:t>
-          </a:r>
-          <a:r>
             <a:rPr lang="de-DE" dirty="0"/>
-            <a:t> Control</a:t>
+            <a:t>Actuator Control</a:t>
           </a:r>
         </a:p>
       </dgm:t>
@@ -1278,13 +1270,8 @@
           </a:r>
           <a:r>
             <a:rPr lang="de-DE" sz="2800" kern="1200" dirty="0"/>
-            <a:t> </a:t>
+            <a:t> Planning</a:t>
           </a:r>
-          <a:r>
-            <a:rPr lang="de-DE" sz="2800" kern="1200" dirty="0" err="1"/>
-            <a:t>Planning</a:t>
-          </a:r>
-          <a:endParaRPr lang="de-DE" sz="2800" kern="1200" dirty="0"/>
         </a:p>
       </dsp:txBody>
       <dsp:txXfrm>
@@ -1694,12 +1681,8 @@
             <a:buNone/>
           </a:pPr>
           <a:r>
-            <a:rPr lang="de-DE" sz="2800" kern="1200" dirty="0" err="1"/>
-            <a:t>Actuator</a:t>
-          </a:r>
-          <a:r>
             <a:rPr lang="de-DE" sz="2800" kern="1200" dirty="0"/>
-            <a:t> Control</a:t>
+            <a:t>Actuator Control</a:t>
           </a:r>
         </a:p>
       </dsp:txBody>
@@ -3039,7 +3022,7 @@
           <a:p>
             <a:fld id="{0652E80E-B1F5-4805-9AD7-A46BA932CB10}" type="datetimeFigureOut">
               <a:rPr lang="de-DE" smtClean="0"/>
-              <a:t>02.09.2020</a:t>
+              <a:t>10.09.2020</a:t>
             </a:fld>
             <a:endParaRPr lang="de-DE"/>
           </a:p>
@@ -3237,7 +3220,7 @@
           <a:p>
             <a:fld id="{0652E80E-B1F5-4805-9AD7-A46BA932CB10}" type="datetimeFigureOut">
               <a:rPr lang="de-DE" smtClean="0"/>
-              <a:t>02.09.2020</a:t>
+              <a:t>10.09.2020</a:t>
             </a:fld>
             <a:endParaRPr lang="de-DE"/>
           </a:p>
@@ -3445,7 +3428,7 @@
           <a:p>
             <a:fld id="{0652E80E-B1F5-4805-9AD7-A46BA932CB10}" type="datetimeFigureOut">
               <a:rPr lang="de-DE" smtClean="0"/>
-              <a:t>02.09.2020</a:t>
+              <a:t>10.09.2020</a:t>
             </a:fld>
             <a:endParaRPr lang="de-DE"/>
           </a:p>
@@ -3643,7 +3626,7 @@
           <a:p>
             <a:fld id="{0652E80E-B1F5-4805-9AD7-A46BA932CB10}" type="datetimeFigureOut">
               <a:rPr lang="de-DE" smtClean="0"/>
-              <a:t>02.09.2020</a:t>
+              <a:t>10.09.2020</a:t>
             </a:fld>
             <a:endParaRPr lang="de-DE"/>
           </a:p>
@@ -3918,7 +3901,7 @@
           <a:p>
             <a:fld id="{0652E80E-B1F5-4805-9AD7-A46BA932CB10}" type="datetimeFigureOut">
               <a:rPr lang="de-DE" smtClean="0"/>
-              <a:t>02.09.2020</a:t>
+              <a:t>10.09.2020</a:t>
             </a:fld>
             <a:endParaRPr lang="de-DE"/>
           </a:p>
@@ -4183,7 +4166,7 @@
           <a:p>
             <a:fld id="{0652E80E-B1F5-4805-9AD7-A46BA932CB10}" type="datetimeFigureOut">
               <a:rPr lang="de-DE" smtClean="0"/>
-              <a:t>02.09.2020</a:t>
+              <a:t>10.09.2020</a:t>
             </a:fld>
             <a:endParaRPr lang="de-DE"/>
           </a:p>
@@ -4595,7 +4578,7 @@
           <a:p>
             <a:fld id="{0652E80E-B1F5-4805-9AD7-A46BA932CB10}" type="datetimeFigureOut">
               <a:rPr lang="de-DE" smtClean="0"/>
-              <a:t>02.09.2020</a:t>
+              <a:t>10.09.2020</a:t>
             </a:fld>
             <a:endParaRPr lang="de-DE"/>
           </a:p>
@@ -4736,7 +4719,7 @@
           <a:p>
             <a:fld id="{0652E80E-B1F5-4805-9AD7-A46BA932CB10}" type="datetimeFigureOut">
               <a:rPr lang="de-DE" smtClean="0"/>
-              <a:t>02.09.2020</a:t>
+              <a:t>10.09.2020</a:t>
             </a:fld>
             <a:endParaRPr lang="de-DE"/>
           </a:p>
@@ -4849,7 +4832,7 @@
           <a:p>
             <a:fld id="{0652E80E-B1F5-4805-9AD7-A46BA932CB10}" type="datetimeFigureOut">
               <a:rPr lang="de-DE" smtClean="0"/>
-              <a:t>02.09.2020</a:t>
+              <a:t>10.09.2020</a:t>
             </a:fld>
             <a:endParaRPr lang="de-DE"/>
           </a:p>
@@ -5160,7 +5143,7 @@
           <a:p>
             <a:fld id="{0652E80E-B1F5-4805-9AD7-A46BA932CB10}" type="datetimeFigureOut">
               <a:rPr lang="de-DE" smtClean="0"/>
-              <a:t>02.09.2020</a:t>
+              <a:t>10.09.2020</a:t>
             </a:fld>
             <a:endParaRPr lang="de-DE"/>
           </a:p>
@@ -5448,7 +5431,7 @@
           <a:p>
             <a:fld id="{0652E80E-B1F5-4805-9AD7-A46BA932CB10}" type="datetimeFigureOut">
               <a:rPr lang="de-DE" smtClean="0"/>
-              <a:t>02.09.2020</a:t>
+              <a:t>10.09.2020</a:t>
             </a:fld>
             <a:endParaRPr lang="de-DE"/>
           </a:p>
@@ -5689,7 +5672,7 @@
           <a:p>
             <a:fld id="{0652E80E-B1F5-4805-9AD7-A46BA932CB10}" type="datetimeFigureOut">
               <a:rPr lang="de-DE" smtClean="0"/>
-              <a:t>02.09.2020</a:t>
+              <a:t>10.09.2020</a:t>
             </a:fld>
             <a:endParaRPr lang="de-DE"/>
           </a:p>
@@ -6467,7 +6450,7 @@
             <a:lstStyle/>
             <a:p>
               <a:r>
-                <a:rPr lang="de-DE" sz="1400" dirty="0" err="1"/>
+                <a:rPr lang="de-DE" sz="1400" dirty="0"/>
                 <a:t>Trajectory</a:t>
               </a:r>
               <a:endParaRPr lang="en-US" sz="1400" dirty="0"/>
@@ -6656,28 +6639,12 @@
             <a:p>
               <a:pPr algn="ctr"/>
               <a:r>
-                <a:rPr lang="de-DE" sz="1600" dirty="0" err="1">
-                  <a:solidFill>
-                    <a:schemeClr val="tx1"/>
-                  </a:solidFill>
-                </a:rPr>
-                <a:t>Trajectory</a:t>
-              </a:r>
-              <a:r>
                 <a:rPr lang="de-DE" sz="1600" dirty="0">
                   <a:solidFill>
                     <a:schemeClr val="tx1"/>
                   </a:solidFill>
                 </a:rPr>
-                <a:t> </a:t>
-              </a:r>
-              <a:r>
-                <a:rPr lang="de-DE" sz="1600" dirty="0" err="1">
-                  <a:solidFill>
-                    <a:schemeClr val="tx1"/>
-                  </a:solidFill>
-                </a:rPr>
-                <a:t>Optimization</a:t>
+                <a:t>Trajectory Optimization</a:t>
               </a:r>
               <a:endParaRPr lang="en-US" sz="1600" dirty="0">
                 <a:solidFill>
@@ -6776,6 +6743,972 @@
 </p:sld>
 </file>
 
+<file path=ppt/slides/slide3.xml><?xml version="1.0" encoding="utf-8"?>
+<p:sld xmlns:a="http://schemas.openxmlformats.org/drawingml/2006/main" xmlns:r="http://schemas.openxmlformats.org/officeDocument/2006/relationships" xmlns:p="http://schemas.openxmlformats.org/presentationml/2006/main">
+  <p:cSld>
+    <p:spTree>
+      <p:nvGrpSpPr>
+        <p:cNvPr id="1" name=""/>
+        <p:cNvGrpSpPr/>
+        <p:nvPr/>
+      </p:nvGrpSpPr>
+      <p:grpSpPr>
+        <a:xfrm>
+          <a:off x="0" y="0"/>
+          <a:ext cx="0" cy="0"/>
+          <a:chOff x="0" y="0"/>
+          <a:chExt cx="0" cy="0"/>
+        </a:xfrm>
+      </p:grpSpPr>
+      <p:grpSp>
+        <p:nvGrpSpPr>
+          <p:cNvPr id="41" name="Gruppieren 40">
+            <a:extLst>
+              <a:ext uri="{FF2B5EF4-FFF2-40B4-BE49-F238E27FC236}">
+                <a16:creationId xmlns:a16="http://schemas.microsoft.com/office/drawing/2014/main" id="{BC5A7F38-BD83-4F6F-B8A6-3452AEB42621}"/>
+              </a:ext>
+            </a:extLst>
+          </p:cNvPr>
+          <p:cNvGrpSpPr/>
+          <p:nvPr/>
+        </p:nvGrpSpPr>
+        <p:grpSpPr>
+          <a:xfrm>
+            <a:off x="3072939" y="2602717"/>
+            <a:ext cx="1133911" cy="1652561"/>
+            <a:chOff x="3458710" y="3435689"/>
+            <a:chExt cx="1251009" cy="1652561"/>
+          </a:xfrm>
+        </p:grpSpPr>
+        <p:sp>
+          <p:nvSpPr>
+            <p:cNvPr id="6" name="Rechteck: abgerundete Ecken 5">
+              <a:extLst>
+                <a:ext uri="{FF2B5EF4-FFF2-40B4-BE49-F238E27FC236}">
+                  <a16:creationId xmlns:a16="http://schemas.microsoft.com/office/drawing/2014/main" id="{C8D94366-EF8C-4028-986B-FE1E3D64A0A6}"/>
+                </a:ext>
+              </a:extLst>
+            </p:cNvPr>
+            <p:cNvSpPr/>
+            <p:nvPr/>
+          </p:nvSpPr>
+          <p:spPr>
+            <a:xfrm>
+              <a:off x="3458710" y="3435689"/>
+              <a:ext cx="1251009" cy="1652561"/>
+            </a:xfrm>
+            <a:prstGeom prst="roundRect">
+              <a:avLst/>
+            </a:prstGeom>
+            <a:solidFill>
+              <a:schemeClr val="bg1"/>
+            </a:solidFill>
+            <a:ln>
+              <a:solidFill>
+                <a:srgbClr val="3668A0"/>
+              </a:solidFill>
+            </a:ln>
+          </p:spPr>
+          <p:style>
+            <a:lnRef idx="2">
+              <a:schemeClr val="accent1">
+                <a:shade val="50000"/>
+              </a:schemeClr>
+            </a:lnRef>
+            <a:fillRef idx="1">
+              <a:schemeClr val="accent1"/>
+            </a:fillRef>
+            <a:effectRef idx="0">
+              <a:schemeClr val="accent1"/>
+            </a:effectRef>
+            <a:fontRef idx="minor">
+              <a:schemeClr val="lt1"/>
+            </a:fontRef>
+          </p:style>
+          <p:txBody>
+            <a:bodyPr rtlCol="0" anchor="t"/>
+            <a:lstStyle/>
+            <a:p>
+              <a:pPr algn="ctr"/>
+              <a:r>
+                <a:rPr lang="de-DE" sz="1600" dirty="0">
+                  <a:solidFill>
+                    <a:schemeClr val="tx1"/>
+                  </a:solidFill>
+                </a:rPr>
+                <a:t>Trajectory File</a:t>
+              </a:r>
+              <a:endParaRPr lang="en-US" sz="1600" dirty="0">
+                <a:solidFill>
+                  <a:schemeClr val="tx1"/>
+                </a:solidFill>
+              </a:endParaRPr>
+            </a:p>
+          </p:txBody>
+        </p:sp>
+        <p:grpSp>
+          <p:nvGrpSpPr>
+            <p:cNvPr id="39" name="Gruppieren 38">
+              <a:extLst>
+                <a:ext uri="{FF2B5EF4-FFF2-40B4-BE49-F238E27FC236}">
+                  <a16:creationId xmlns:a16="http://schemas.microsoft.com/office/drawing/2014/main" id="{A572E544-0DCE-450B-85DE-7904DCA78C56}"/>
+                </a:ext>
+              </a:extLst>
+            </p:cNvPr>
+            <p:cNvGrpSpPr/>
+            <p:nvPr/>
+          </p:nvGrpSpPr>
+          <p:grpSpPr>
+            <a:xfrm>
+              <a:off x="3694127" y="4264394"/>
+              <a:ext cx="780176" cy="597680"/>
+              <a:chOff x="3694127" y="4264395"/>
+              <a:chExt cx="780176" cy="597680"/>
+            </a:xfrm>
+          </p:grpSpPr>
+          <p:cxnSp>
+            <p:nvCxnSpPr>
+              <p:cNvPr id="8" name="Gerader Verbinder 7">
+                <a:extLst>
+                  <a:ext uri="{FF2B5EF4-FFF2-40B4-BE49-F238E27FC236}">
+                    <a16:creationId xmlns:a16="http://schemas.microsoft.com/office/drawing/2014/main" id="{27177B02-3FDD-46E3-836B-3D5B236FC002}"/>
+                  </a:ext>
+                </a:extLst>
+              </p:cNvPr>
+              <p:cNvCxnSpPr>
+                <a:cxnSpLocks/>
+              </p:cNvCxnSpPr>
+              <p:nvPr/>
+            </p:nvCxnSpPr>
+            <p:spPr>
+              <a:xfrm>
+                <a:off x="3694127" y="4264395"/>
+                <a:ext cx="780176" cy="1"/>
+              </a:xfrm>
+              <a:prstGeom prst="line">
+                <a:avLst/>
+              </a:prstGeom>
+            </p:spPr>
+            <p:style>
+              <a:lnRef idx="1">
+                <a:schemeClr val="accent1"/>
+              </a:lnRef>
+              <a:fillRef idx="0">
+                <a:schemeClr val="accent1"/>
+              </a:fillRef>
+              <a:effectRef idx="0">
+                <a:schemeClr val="accent1"/>
+              </a:effectRef>
+              <a:fontRef idx="minor">
+                <a:schemeClr val="tx1"/>
+              </a:fontRef>
+            </p:style>
+          </p:cxnSp>
+          <p:cxnSp>
+            <p:nvCxnSpPr>
+              <p:cNvPr id="10" name="Gerader Verbinder 9">
+                <a:extLst>
+                  <a:ext uri="{FF2B5EF4-FFF2-40B4-BE49-F238E27FC236}">
+                    <a16:creationId xmlns:a16="http://schemas.microsoft.com/office/drawing/2014/main" id="{0BF7CC6C-AC1A-4AA8-BEF4-1E9E4D365500}"/>
+                  </a:ext>
+                </a:extLst>
+              </p:cNvPr>
+              <p:cNvCxnSpPr>
+                <a:cxnSpLocks/>
+              </p:cNvCxnSpPr>
+              <p:nvPr/>
+            </p:nvCxnSpPr>
+            <p:spPr>
+              <a:xfrm>
+                <a:off x="3694127" y="4406980"/>
+                <a:ext cx="780176" cy="1"/>
+              </a:xfrm>
+              <a:prstGeom prst="line">
+                <a:avLst/>
+              </a:prstGeom>
+            </p:spPr>
+            <p:style>
+              <a:lnRef idx="1">
+                <a:schemeClr val="accent1"/>
+              </a:lnRef>
+              <a:fillRef idx="0">
+                <a:schemeClr val="accent1"/>
+              </a:fillRef>
+              <a:effectRef idx="0">
+                <a:schemeClr val="accent1"/>
+              </a:effectRef>
+              <a:fontRef idx="minor">
+                <a:schemeClr val="tx1"/>
+              </a:fontRef>
+            </p:style>
+          </p:cxnSp>
+          <p:cxnSp>
+            <p:nvCxnSpPr>
+              <p:cNvPr id="12" name="Gerader Verbinder 11">
+                <a:extLst>
+                  <a:ext uri="{FF2B5EF4-FFF2-40B4-BE49-F238E27FC236}">
+                    <a16:creationId xmlns:a16="http://schemas.microsoft.com/office/drawing/2014/main" id="{3D0AC4ED-97DF-4127-9440-E5D426EE3358}"/>
+                  </a:ext>
+                </a:extLst>
+              </p:cNvPr>
+              <p:cNvCxnSpPr>
+                <a:cxnSpLocks/>
+              </p:cNvCxnSpPr>
+              <p:nvPr/>
+            </p:nvCxnSpPr>
+            <p:spPr>
+              <a:xfrm>
+                <a:off x="3694127" y="4558679"/>
+                <a:ext cx="780176" cy="1"/>
+              </a:xfrm>
+              <a:prstGeom prst="line">
+                <a:avLst/>
+              </a:prstGeom>
+            </p:spPr>
+            <p:style>
+              <a:lnRef idx="1">
+                <a:schemeClr val="accent1"/>
+              </a:lnRef>
+              <a:fillRef idx="0">
+                <a:schemeClr val="accent1"/>
+              </a:fillRef>
+              <a:effectRef idx="0">
+                <a:schemeClr val="accent1"/>
+              </a:effectRef>
+              <a:fontRef idx="minor">
+                <a:schemeClr val="tx1"/>
+              </a:fontRef>
+            </p:style>
+          </p:cxnSp>
+          <p:cxnSp>
+            <p:nvCxnSpPr>
+              <p:cNvPr id="14" name="Gerader Verbinder 13">
+                <a:extLst>
+                  <a:ext uri="{FF2B5EF4-FFF2-40B4-BE49-F238E27FC236}">
+                    <a16:creationId xmlns:a16="http://schemas.microsoft.com/office/drawing/2014/main" id="{9BB63DBA-5CF8-4F0A-B5EE-B7BAC94ECD8F}"/>
+                  </a:ext>
+                </a:extLst>
+              </p:cNvPr>
+              <p:cNvCxnSpPr>
+                <a:cxnSpLocks/>
+              </p:cNvCxnSpPr>
+              <p:nvPr/>
+            </p:nvCxnSpPr>
+            <p:spPr>
+              <a:xfrm>
+                <a:off x="3694127" y="4710377"/>
+                <a:ext cx="780176" cy="1"/>
+              </a:xfrm>
+              <a:prstGeom prst="line">
+                <a:avLst/>
+              </a:prstGeom>
+            </p:spPr>
+            <p:style>
+              <a:lnRef idx="1">
+                <a:schemeClr val="accent1"/>
+              </a:lnRef>
+              <a:fillRef idx="0">
+                <a:schemeClr val="accent1"/>
+              </a:fillRef>
+              <a:effectRef idx="0">
+                <a:schemeClr val="accent1"/>
+              </a:effectRef>
+              <a:fontRef idx="minor">
+                <a:schemeClr val="tx1"/>
+              </a:fontRef>
+            </p:style>
+          </p:cxnSp>
+          <p:cxnSp>
+            <p:nvCxnSpPr>
+              <p:cNvPr id="16" name="Gerader Verbinder 15">
+                <a:extLst>
+                  <a:ext uri="{FF2B5EF4-FFF2-40B4-BE49-F238E27FC236}">
+                    <a16:creationId xmlns:a16="http://schemas.microsoft.com/office/drawing/2014/main" id="{CB7DC6F7-2771-4678-BFCF-09EAF8B74104}"/>
+                  </a:ext>
+                </a:extLst>
+              </p:cNvPr>
+              <p:cNvCxnSpPr>
+                <a:cxnSpLocks/>
+              </p:cNvCxnSpPr>
+              <p:nvPr/>
+            </p:nvCxnSpPr>
+            <p:spPr>
+              <a:xfrm>
+                <a:off x="3694127" y="4862074"/>
+                <a:ext cx="780176" cy="1"/>
+              </a:xfrm>
+              <a:prstGeom prst="line">
+                <a:avLst/>
+              </a:prstGeom>
+            </p:spPr>
+            <p:style>
+              <a:lnRef idx="1">
+                <a:schemeClr val="accent1"/>
+              </a:lnRef>
+              <a:fillRef idx="0">
+                <a:schemeClr val="accent1"/>
+              </a:fillRef>
+              <a:effectRef idx="0">
+                <a:schemeClr val="accent1"/>
+              </a:effectRef>
+              <a:fontRef idx="minor">
+                <a:schemeClr val="tx1"/>
+              </a:fontRef>
+            </p:style>
+          </p:cxnSp>
+        </p:grpSp>
+      </p:grpSp>
+      <p:sp>
+        <p:nvSpPr>
+          <p:cNvPr id="18" name="Rechteck: abgerundete Ecken 17">
+            <a:extLst>
+              <a:ext uri="{FF2B5EF4-FFF2-40B4-BE49-F238E27FC236}">
+                <a16:creationId xmlns:a16="http://schemas.microsoft.com/office/drawing/2014/main" id="{2BA5E4ED-E5E7-4445-9C49-A39C758DACC4}"/>
+              </a:ext>
+            </a:extLst>
+          </p:cNvPr>
+          <p:cNvSpPr/>
+          <p:nvPr/>
+        </p:nvSpPr>
+        <p:spPr>
+          <a:xfrm>
+            <a:off x="6175249" y="3110211"/>
+            <a:ext cx="1434168" cy="642421"/>
+          </a:xfrm>
+          <a:prstGeom prst="roundRect">
+            <a:avLst/>
+          </a:prstGeom>
+          <a:solidFill>
+            <a:schemeClr val="bg1"/>
+          </a:solidFill>
+          <a:ln>
+            <a:solidFill>
+              <a:srgbClr val="3668A0"/>
+            </a:solidFill>
+          </a:ln>
+        </p:spPr>
+        <p:style>
+          <a:lnRef idx="2">
+            <a:schemeClr val="accent1">
+              <a:shade val="50000"/>
+            </a:schemeClr>
+          </a:lnRef>
+          <a:fillRef idx="1">
+            <a:schemeClr val="accent1"/>
+          </a:fillRef>
+          <a:effectRef idx="0">
+            <a:schemeClr val="accent1"/>
+          </a:effectRef>
+          <a:fontRef idx="minor">
+            <a:schemeClr val="lt1"/>
+          </a:fontRef>
+        </p:style>
+        <p:txBody>
+          <a:bodyPr rtlCol="0" anchor="ctr"/>
+          <a:lstStyle/>
+          <a:p>
+            <a:pPr algn="ctr"/>
+            <a:r>
+              <a:rPr lang="de-DE" sz="1600" dirty="0">
+                <a:solidFill>
+                  <a:schemeClr val="tx1"/>
+                </a:solidFill>
+              </a:rPr>
+              <a:t>HyRoDyn</a:t>
+            </a:r>
+            <a:endParaRPr lang="en-US" sz="1600" dirty="0">
+              <a:solidFill>
+                <a:schemeClr val="tx1"/>
+              </a:solidFill>
+            </a:endParaRPr>
+          </a:p>
+        </p:txBody>
+      </p:sp>
+      <p:sp>
+        <p:nvSpPr>
+          <p:cNvPr id="20" name="Rechteck: abgerundete Ecken 19">
+            <a:extLst>
+              <a:ext uri="{FF2B5EF4-FFF2-40B4-BE49-F238E27FC236}">
+                <a16:creationId xmlns:a16="http://schemas.microsoft.com/office/drawing/2014/main" id="{E4961BAF-1D33-4901-ABD6-71A5146DC497}"/>
+              </a:ext>
+            </a:extLst>
+          </p:cNvPr>
+          <p:cNvSpPr/>
+          <p:nvPr/>
+        </p:nvSpPr>
+        <p:spPr>
+          <a:xfrm>
+            <a:off x="8178186" y="3101577"/>
+            <a:ext cx="1434168" cy="642421"/>
+          </a:xfrm>
+          <a:prstGeom prst="roundRect">
+            <a:avLst/>
+          </a:prstGeom>
+          <a:solidFill>
+            <a:schemeClr val="bg1"/>
+          </a:solidFill>
+          <a:ln>
+            <a:solidFill>
+              <a:srgbClr val="3668A0"/>
+            </a:solidFill>
+          </a:ln>
+        </p:spPr>
+        <p:style>
+          <a:lnRef idx="2">
+            <a:schemeClr val="accent1">
+              <a:shade val="50000"/>
+            </a:schemeClr>
+          </a:lnRef>
+          <a:fillRef idx="1">
+            <a:schemeClr val="accent1"/>
+          </a:fillRef>
+          <a:effectRef idx="0">
+            <a:schemeClr val="accent1"/>
+          </a:effectRef>
+          <a:fontRef idx="minor">
+            <a:schemeClr val="lt1"/>
+          </a:fontRef>
+        </p:style>
+        <p:txBody>
+          <a:bodyPr rtlCol="0" anchor="ctr"/>
+          <a:lstStyle/>
+          <a:p>
+            <a:pPr algn="ctr"/>
+            <a:r>
+              <a:rPr lang="de-DE" sz="1600" dirty="0">
+                <a:solidFill>
+                  <a:schemeClr val="tx1"/>
+                </a:solidFill>
+              </a:rPr>
+              <a:t>Actuator Control</a:t>
+            </a:r>
+            <a:endParaRPr lang="en-US" sz="1600" dirty="0">
+              <a:solidFill>
+                <a:schemeClr val="tx1"/>
+              </a:solidFill>
+            </a:endParaRPr>
+          </a:p>
+        </p:txBody>
+      </p:sp>
+      <p:cxnSp>
+        <p:nvCxnSpPr>
+          <p:cNvPr id="22" name="Gerade Verbindung mit Pfeil 21">
+            <a:extLst>
+              <a:ext uri="{FF2B5EF4-FFF2-40B4-BE49-F238E27FC236}">
+                <a16:creationId xmlns:a16="http://schemas.microsoft.com/office/drawing/2014/main" id="{B28978F1-6AAE-40FC-B682-CF1FCFDF8ABD}"/>
+              </a:ext>
+            </a:extLst>
+          </p:cNvPr>
+          <p:cNvCxnSpPr>
+            <a:cxnSpLocks/>
+            <a:stCxn id="6" idx="3"/>
+            <a:endCxn id="40" idx="2"/>
+          </p:cNvCxnSpPr>
+          <p:nvPr/>
+        </p:nvCxnSpPr>
+        <p:spPr>
+          <a:xfrm flipV="1">
+            <a:off x="4206850" y="3422787"/>
+            <a:ext cx="1229614" cy="6211"/>
+          </a:xfrm>
+          <a:prstGeom prst="straightConnector1">
+            <a:avLst/>
+          </a:prstGeom>
+          <a:ln>
+            <a:tailEnd type="triangle"/>
+          </a:ln>
+        </p:spPr>
+        <p:style>
+          <a:lnRef idx="1">
+            <a:schemeClr val="accent1"/>
+          </a:lnRef>
+          <a:fillRef idx="0">
+            <a:schemeClr val="accent1"/>
+          </a:fillRef>
+          <a:effectRef idx="0">
+            <a:schemeClr val="accent1"/>
+          </a:effectRef>
+          <a:fontRef idx="minor">
+            <a:schemeClr val="tx1"/>
+          </a:fontRef>
+        </p:style>
+      </p:cxnSp>
+      <p:cxnSp>
+        <p:nvCxnSpPr>
+          <p:cNvPr id="24" name="Gerade Verbindung mit Pfeil 23">
+            <a:extLst>
+              <a:ext uri="{FF2B5EF4-FFF2-40B4-BE49-F238E27FC236}">
+                <a16:creationId xmlns:a16="http://schemas.microsoft.com/office/drawing/2014/main" id="{0FCFC532-46B6-4616-B7B0-910551818878}"/>
+              </a:ext>
+            </a:extLst>
+          </p:cNvPr>
+          <p:cNvCxnSpPr>
+            <a:cxnSpLocks/>
+            <a:stCxn id="18" idx="3"/>
+            <a:endCxn id="20" idx="1"/>
+          </p:cNvCxnSpPr>
+          <p:nvPr/>
+        </p:nvCxnSpPr>
+        <p:spPr>
+          <a:xfrm flipV="1">
+            <a:off x="7609417" y="3422788"/>
+            <a:ext cx="568769" cy="8634"/>
+          </a:xfrm>
+          <a:prstGeom prst="straightConnector1">
+            <a:avLst/>
+          </a:prstGeom>
+          <a:ln>
+            <a:tailEnd type="triangle"/>
+          </a:ln>
+        </p:spPr>
+        <p:style>
+          <a:lnRef idx="1">
+            <a:schemeClr val="accent1"/>
+          </a:lnRef>
+          <a:fillRef idx="0">
+            <a:schemeClr val="accent1"/>
+          </a:fillRef>
+          <a:effectRef idx="0">
+            <a:schemeClr val="accent1"/>
+          </a:effectRef>
+          <a:fontRef idx="minor">
+            <a:schemeClr val="tx1"/>
+          </a:fontRef>
+        </p:style>
+      </p:cxnSp>
+      <p:sp>
+        <p:nvSpPr>
+          <p:cNvPr id="31" name="Rechteck 30">
+            <a:extLst>
+              <a:ext uri="{FF2B5EF4-FFF2-40B4-BE49-F238E27FC236}">
+                <a16:creationId xmlns:a16="http://schemas.microsoft.com/office/drawing/2014/main" id="{69BA51E3-1EC6-4311-A04A-F6F8EF84449A}"/>
+              </a:ext>
+            </a:extLst>
+          </p:cNvPr>
+          <p:cNvSpPr/>
+          <p:nvPr/>
+        </p:nvSpPr>
+        <p:spPr>
+          <a:xfrm>
+            <a:off x="167779" y="1390078"/>
+            <a:ext cx="1887524" cy="285155"/>
+          </a:xfrm>
+          <a:prstGeom prst="rect">
+            <a:avLst/>
+          </a:prstGeom>
+          <a:noFill/>
+          <a:ln>
+            <a:prstDash val="sysDash"/>
+          </a:ln>
+        </p:spPr>
+        <p:style>
+          <a:lnRef idx="2">
+            <a:schemeClr val="accent1">
+              <a:shade val="50000"/>
+            </a:schemeClr>
+          </a:lnRef>
+          <a:fillRef idx="1">
+            <a:schemeClr val="accent1"/>
+          </a:fillRef>
+          <a:effectRef idx="0">
+            <a:schemeClr val="accent1"/>
+          </a:effectRef>
+          <a:fontRef idx="minor">
+            <a:schemeClr val="lt1"/>
+          </a:fontRef>
+        </p:style>
+        <p:txBody>
+          <a:bodyPr rtlCol="0" anchor="ctr"/>
+          <a:lstStyle/>
+          <a:p>
+            <a:pPr algn="ctr"/>
+            <a:r>
+              <a:rPr lang="de-DE" sz="1200" dirty="0">
+                <a:solidFill>
+                  <a:schemeClr val="tx1"/>
+                </a:solidFill>
+              </a:rPr>
+              <a:t>1.. Offline Motion Planning</a:t>
+            </a:r>
+          </a:p>
+        </p:txBody>
+      </p:sp>
+      <p:sp>
+        <p:nvSpPr>
+          <p:cNvPr id="33" name="Rechteck 32">
+            <a:extLst>
+              <a:ext uri="{FF2B5EF4-FFF2-40B4-BE49-F238E27FC236}">
+                <a16:creationId xmlns:a16="http://schemas.microsoft.com/office/drawing/2014/main" id="{D764011D-D384-4BE2-B6CD-C65EC1B6C749}"/>
+              </a:ext>
+            </a:extLst>
+          </p:cNvPr>
+          <p:cNvSpPr/>
+          <p:nvPr/>
+        </p:nvSpPr>
+        <p:spPr>
+          <a:xfrm>
+            <a:off x="167779" y="3289976"/>
+            <a:ext cx="1887524" cy="285155"/>
+          </a:xfrm>
+          <a:prstGeom prst="rect">
+            <a:avLst/>
+          </a:prstGeom>
+          <a:noFill/>
+          <a:ln>
+            <a:prstDash val="sysDash"/>
+          </a:ln>
+        </p:spPr>
+        <p:style>
+          <a:lnRef idx="2">
+            <a:schemeClr val="accent1">
+              <a:shade val="50000"/>
+            </a:schemeClr>
+          </a:lnRef>
+          <a:fillRef idx="1">
+            <a:schemeClr val="accent1"/>
+          </a:fillRef>
+          <a:effectRef idx="0">
+            <a:schemeClr val="accent1"/>
+          </a:effectRef>
+          <a:fontRef idx="minor">
+            <a:schemeClr val="lt1"/>
+          </a:fontRef>
+        </p:style>
+        <p:txBody>
+          <a:bodyPr rtlCol="0" anchor="ctr"/>
+          <a:lstStyle/>
+          <a:p>
+            <a:pPr algn="ctr"/>
+            <a:r>
+              <a:rPr lang="de-DE" sz="1200" dirty="0">
+                <a:solidFill>
+                  <a:schemeClr val="tx1"/>
+                </a:solidFill>
+              </a:rPr>
+              <a:t>2. Online Stabilization</a:t>
+            </a:r>
+          </a:p>
+        </p:txBody>
+      </p:sp>
+      <p:pic>
+        <p:nvPicPr>
+          <p:cNvPr id="64" name="Grafik 63">
+            <a:extLst>
+              <a:ext uri="{FF2B5EF4-FFF2-40B4-BE49-F238E27FC236}">
+                <a16:creationId xmlns:a16="http://schemas.microsoft.com/office/drawing/2014/main" id="{C98F8F32-17B1-4121-A1CD-641D594D28CF}"/>
+              </a:ext>
+            </a:extLst>
+          </p:cNvPr>
+          <p:cNvPicPr>
+            <a:picLocks noChangeAspect="1"/>
+          </p:cNvPicPr>
+          <p:nvPr>
+            <p:custDataLst>
+              <p:tags r:id="rId1"/>
+            </p:custDataLst>
+          </p:nvPr>
+        </p:nvPicPr>
+        <p:blipFill>
+          <a:blip r:embed="rId3">
+            <a:extLst>
+              <a:ext uri="{28A0092B-C50C-407E-A947-70E740481C1C}">
+                <a14:useLocalDpi xmlns:a14="http://schemas.microsoft.com/office/drawing/2010/main" val="0"/>
+              </a:ext>
+            </a:extLst>
+          </a:blip>
+          <a:stretch>
+            <a:fillRect/>
+          </a:stretch>
+        </p:blipFill>
+        <p:spPr>
+          <a:xfrm>
+            <a:off x="4385212" y="3235174"/>
+            <a:ext cx="812800" cy="150857"/>
+          </a:xfrm>
+          <a:prstGeom prst="rect">
+            <a:avLst/>
+          </a:prstGeom>
+        </p:spPr>
+      </p:pic>
+      <p:sp>
+        <p:nvSpPr>
+          <p:cNvPr id="62" name="Rechteck: abgerundete Ecken 61">
+            <a:extLst>
+              <a:ext uri="{FF2B5EF4-FFF2-40B4-BE49-F238E27FC236}">
+                <a16:creationId xmlns:a16="http://schemas.microsoft.com/office/drawing/2014/main" id="{08E9F9A7-C88C-4BAD-94BC-E1B8B75AC0B1}"/>
+              </a:ext>
+            </a:extLst>
+          </p:cNvPr>
+          <p:cNvSpPr/>
+          <p:nvPr/>
+        </p:nvSpPr>
+        <p:spPr>
+          <a:xfrm>
+            <a:off x="2445197" y="1118370"/>
+            <a:ext cx="2389396" cy="828572"/>
+          </a:xfrm>
+          <a:prstGeom prst="roundRect">
+            <a:avLst/>
+          </a:prstGeom>
+          <a:solidFill>
+            <a:schemeClr val="bg1"/>
+          </a:solidFill>
+          <a:ln>
+            <a:solidFill>
+              <a:srgbClr val="3668A0"/>
+            </a:solidFill>
+          </a:ln>
+        </p:spPr>
+        <p:style>
+          <a:lnRef idx="2">
+            <a:schemeClr val="accent1">
+              <a:shade val="50000"/>
+            </a:schemeClr>
+          </a:lnRef>
+          <a:fillRef idx="1">
+            <a:schemeClr val="accent1"/>
+          </a:fillRef>
+          <a:effectRef idx="0">
+            <a:schemeClr val="accent1"/>
+          </a:effectRef>
+          <a:fontRef idx="minor">
+            <a:schemeClr val="lt1"/>
+          </a:fontRef>
+        </p:style>
+        <p:txBody>
+          <a:bodyPr rtlCol="0" anchor="ctr"/>
+          <a:lstStyle/>
+          <a:p>
+            <a:pPr algn="ctr"/>
+            <a:r>
+              <a:rPr lang="de-DE" sz="1600" dirty="0">
+                <a:solidFill>
+                  <a:schemeClr val="tx1"/>
+                </a:solidFill>
+              </a:rPr>
+              <a:t>Whole-Body </a:t>
+            </a:r>
+          </a:p>
+          <a:p>
+            <a:pPr algn="ctr"/>
+            <a:r>
+              <a:rPr lang="de-DE" sz="1600" dirty="0">
+                <a:solidFill>
+                  <a:schemeClr val="tx1"/>
+                </a:solidFill>
+              </a:rPr>
+              <a:t>Trajectory Optimization</a:t>
+            </a:r>
+            <a:endParaRPr lang="en-US" sz="1600" dirty="0">
+              <a:solidFill>
+                <a:schemeClr val="tx1"/>
+              </a:solidFill>
+            </a:endParaRPr>
+          </a:p>
+        </p:txBody>
+      </p:sp>
+      <p:cxnSp>
+        <p:nvCxnSpPr>
+          <p:cNvPr id="25" name="Gerade Verbindung mit Pfeil 24">
+            <a:extLst>
+              <a:ext uri="{FF2B5EF4-FFF2-40B4-BE49-F238E27FC236}">
+                <a16:creationId xmlns:a16="http://schemas.microsoft.com/office/drawing/2014/main" id="{843BAB83-EA30-4897-9DE5-3EC0099701E4}"/>
+              </a:ext>
+            </a:extLst>
+          </p:cNvPr>
+          <p:cNvCxnSpPr>
+            <a:cxnSpLocks/>
+            <a:stCxn id="62" idx="2"/>
+            <a:endCxn id="6" idx="0"/>
+          </p:cNvCxnSpPr>
+          <p:nvPr/>
+        </p:nvCxnSpPr>
+        <p:spPr>
+          <a:xfrm>
+            <a:off x="3639895" y="1946942"/>
+            <a:ext cx="0" cy="655775"/>
+          </a:xfrm>
+          <a:prstGeom prst="straightConnector1">
+            <a:avLst/>
+          </a:prstGeom>
+          <a:ln>
+            <a:tailEnd type="triangle"/>
+          </a:ln>
+        </p:spPr>
+        <p:style>
+          <a:lnRef idx="1">
+            <a:schemeClr val="accent1"/>
+          </a:lnRef>
+          <a:fillRef idx="0">
+            <a:schemeClr val="accent1"/>
+          </a:fillRef>
+          <a:effectRef idx="0">
+            <a:schemeClr val="accent1"/>
+          </a:effectRef>
+          <a:fontRef idx="minor">
+            <a:schemeClr val="tx1"/>
+          </a:fontRef>
+        </p:style>
+      </p:cxnSp>
+      <p:cxnSp>
+        <p:nvCxnSpPr>
+          <p:cNvPr id="37" name="Verbinder: gewinkelt 36">
+            <a:extLst>
+              <a:ext uri="{FF2B5EF4-FFF2-40B4-BE49-F238E27FC236}">
+                <a16:creationId xmlns:a16="http://schemas.microsoft.com/office/drawing/2014/main" id="{400F958C-FE9E-4BFA-A710-515E9D10F83D}"/>
+              </a:ext>
+            </a:extLst>
+          </p:cNvPr>
+          <p:cNvCxnSpPr>
+            <a:cxnSpLocks/>
+            <a:stCxn id="20" idx="2"/>
+            <a:endCxn id="40" idx="4"/>
+          </p:cNvCxnSpPr>
+          <p:nvPr/>
+        </p:nvCxnSpPr>
+        <p:spPr>
+          <a:xfrm rot="5400000" flipH="1">
+            <a:off x="7090399" y="1939127"/>
+            <a:ext cx="237754" cy="3371988"/>
+          </a:xfrm>
+          <a:prstGeom prst="bentConnector3">
+            <a:avLst>
+              <a:gd name="adj1" fmla="val -226702"/>
+            </a:avLst>
+          </a:prstGeom>
+          <a:ln>
+            <a:tailEnd type="triangle"/>
+          </a:ln>
+        </p:spPr>
+        <p:style>
+          <a:lnRef idx="1">
+            <a:schemeClr val="accent1"/>
+          </a:lnRef>
+          <a:fillRef idx="0">
+            <a:schemeClr val="accent1"/>
+          </a:fillRef>
+          <a:effectRef idx="0">
+            <a:schemeClr val="accent1"/>
+          </a:effectRef>
+          <a:fontRef idx="minor">
+            <a:schemeClr val="tx1"/>
+          </a:fontRef>
+        </p:style>
+      </p:cxnSp>
+      <p:sp>
+        <p:nvSpPr>
+          <p:cNvPr id="40" name="Flussdiagramm: Zusammenführung 39">
+            <a:extLst>
+              <a:ext uri="{FF2B5EF4-FFF2-40B4-BE49-F238E27FC236}">
+                <a16:creationId xmlns:a16="http://schemas.microsoft.com/office/drawing/2014/main" id="{05106233-03BD-4F63-B39D-41C8E2B79A3D}"/>
+              </a:ext>
+            </a:extLst>
+          </p:cNvPr>
+          <p:cNvSpPr/>
+          <p:nvPr/>
+        </p:nvSpPr>
+        <p:spPr>
+          <a:xfrm>
+            <a:off x="5436464" y="3339330"/>
+            <a:ext cx="173635" cy="166914"/>
+          </a:xfrm>
+          <a:prstGeom prst="flowChartSummingJunction">
+            <a:avLst/>
+          </a:prstGeom>
+          <a:solidFill>
+            <a:schemeClr val="bg1"/>
+          </a:solidFill>
+          <a:ln>
+            <a:solidFill>
+              <a:srgbClr val="3668A0"/>
+            </a:solidFill>
+          </a:ln>
+        </p:spPr>
+        <p:style>
+          <a:lnRef idx="2">
+            <a:schemeClr val="accent1">
+              <a:shade val="50000"/>
+            </a:schemeClr>
+          </a:lnRef>
+          <a:fillRef idx="1">
+            <a:schemeClr val="accent1"/>
+          </a:fillRef>
+          <a:effectRef idx="0">
+            <a:schemeClr val="accent1"/>
+          </a:effectRef>
+          <a:fontRef idx="minor">
+            <a:schemeClr val="lt1"/>
+          </a:fontRef>
+        </p:style>
+        <p:txBody>
+          <a:bodyPr rtlCol="0" anchor="t"/>
+          <a:lstStyle/>
+          <a:p>
+            <a:pPr algn="ctr"/>
+            <a:endParaRPr lang="de-DE" sz="1600">
+              <a:solidFill>
+                <a:schemeClr val="tx1"/>
+              </a:solidFill>
+            </a:endParaRPr>
+          </a:p>
+        </p:txBody>
+      </p:sp>
+      <p:cxnSp>
+        <p:nvCxnSpPr>
+          <p:cNvPr id="47" name="Gerade Verbindung mit Pfeil 46">
+            <a:extLst>
+              <a:ext uri="{FF2B5EF4-FFF2-40B4-BE49-F238E27FC236}">
+                <a16:creationId xmlns:a16="http://schemas.microsoft.com/office/drawing/2014/main" id="{0AF848A5-F9C6-4E0D-9E76-6399662B43B1}"/>
+              </a:ext>
+            </a:extLst>
+          </p:cNvPr>
+          <p:cNvCxnSpPr>
+            <a:cxnSpLocks/>
+            <a:stCxn id="40" idx="6"/>
+            <a:endCxn id="18" idx="1"/>
+          </p:cNvCxnSpPr>
+          <p:nvPr/>
+        </p:nvCxnSpPr>
+        <p:spPr>
+          <a:xfrm>
+            <a:off x="5610099" y="3422787"/>
+            <a:ext cx="565150" cy="8635"/>
+          </a:xfrm>
+          <a:prstGeom prst="straightConnector1">
+            <a:avLst/>
+          </a:prstGeom>
+          <a:ln>
+            <a:tailEnd type="triangle"/>
+          </a:ln>
+        </p:spPr>
+        <p:style>
+          <a:lnRef idx="1">
+            <a:schemeClr val="accent1"/>
+          </a:lnRef>
+          <a:fillRef idx="0">
+            <a:schemeClr val="accent1"/>
+          </a:fillRef>
+          <a:effectRef idx="0">
+            <a:schemeClr val="accent1"/>
+          </a:effectRef>
+          <a:fontRef idx="minor">
+            <a:schemeClr val="tx1"/>
+          </a:fontRef>
+        </p:style>
+      </p:cxnSp>
+    </p:spTree>
+    <p:extLst>
+      <p:ext uri="{BB962C8B-B14F-4D97-AF65-F5344CB8AC3E}">
+        <p14:creationId xmlns:p14="http://schemas.microsoft.com/office/powerpoint/2010/main" val="2614060875"/>
+      </p:ext>
+    </p:extLst>
+  </p:cSld>
+  <p:clrMapOvr>
+    <a:masterClrMapping/>
+  </p:clrMapOvr>
+</p:sld>
+</file>
+
 <file path=ppt/tags/tag1.xml><?xml version="1.0" encoding="utf-8"?>
 <p:tagLst xmlns:a="http://schemas.openxmlformats.org/drawingml/2006/main" xmlns:r="http://schemas.openxmlformats.org/officeDocument/2006/relationships" xmlns:p="http://schemas.openxmlformats.org/presentationml/2006/main">
   <p:tag name="OUTPUTDPI" val="1200"/>
@@ -6784,6 +7717,25 @@
   <p:tag name="LATEXADDIN" val="\documentclass{article}&#10;\usepackage{amsmath}&#10;\usepackage{bm}&#10;\newcommand{\myM}[1]{\bm{\mathit{#1}}}&#10;\pagestyle{empty}&#10;\begin{document}&#10;&#10;$$&#10;\mathbf{X}^*,\mathbf{U}^*&#10;$$&#10;&#10;&#10;\end{document}"/>
   <p:tag name="IGUANATEXSIZE" val="14"/>
   <p:tag name="IGUANATEXCURSOR" val="139"/>
+  <p:tag name="TRANSPARENCY" val="Wahr"/>
+  <p:tag name="FILENAME" val=""/>
+  <p:tag name="LATEXENGINEID" val="0"/>
+  <p:tag name="TEMPFOLDER" val="c:\temp\"/>
+  <p:tag name="LATEXFORMHEIGHT" val="312"/>
+  <p:tag name="LATEXFORMWIDTH" val="384"/>
+  <p:tag name="LATEXFORMWRAP" val="Wahr"/>
+  <p:tag name="BITMAPVECTOR" val="0"/>
+</p:tagLst>
+</file>
+
+<file path=ppt/tags/tag2.xml><?xml version="1.0" encoding="utf-8"?>
+<p:tagLst xmlns:a="http://schemas.openxmlformats.org/drawingml/2006/main" xmlns:r="http://schemas.openxmlformats.org/officeDocument/2006/relationships" xmlns:p="http://schemas.openxmlformats.org/presentationml/2006/main">
+  <p:tag name="OUTPUTDPI" val="1200"/>
+  <p:tag name="ORIGINALHEIGHT" val="123,7346"/>
+  <p:tag name="ORIGINALWIDTH" val="666,6667"/>
+  <p:tag name="LATEXADDIN" val="\documentclass{article}&#10;\usepackage{amsmath}&#10;\usepackage{bm}&#10;\newcommand{\myM}[1]{\bm{\mathit{#1}}}&#10;\pagestyle{empty}&#10;\begin{document}&#10;&#10;$$&#10;\mathbf{X}^*,\mathbf{U}^*, \mathbf{F}_{ext}^*&#10;$$&#10;&#10;&#10;\end{document}"/>
+  <p:tag name="IGUANATEXSIZE" val="12"/>
+  <p:tag name="IGUANATEXCURSOR" val="182"/>
   <p:tag name="TRANSPARENCY" val="Wahr"/>
   <p:tag name="FILENAME" val=""/>
   <p:tag name="LATEXENGINEID" val="0"/>

</xml_diff>

<commit_message>
[chapter6] Added first complete draft
</commit_message>
<xml_diff>
--- a/img/pptGraphs.pptx
+++ b/img/pptGraphs.pptx
@@ -3022,7 +3022,7 @@
           <a:p>
             <a:fld id="{0652E80E-B1F5-4805-9AD7-A46BA932CB10}" type="datetimeFigureOut">
               <a:rPr lang="de-DE" smtClean="0"/>
-              <a:t>10.09.2020</a:t>
+              <a:t>11.09.2020</a:t>
             </a:fld>
             <a:endParaRPr lang="de-DE"/>
           </a:p>
@@ -3220,7 +3220,7 @@
           <a:p>
             <a:fld id="{0652E80E-B1F5-4805-9AD7-A46BA932CB10}" type="datetimeFigureOut">
               <a:rPr lang="de-DE" smtClean="0"/>
-              <a:t>10.09.2020</a:t>
+              <a:t>11.09.2020</a:t>
             </a:fld>
             <a:endParaRPr lang="de-DE"/>
           </a:p>
@@ -3428,7 +3428,7 @@
           <a:p>
             <a:fld id="{0652E80E-B1F5-4805-9AD7-A46BA932CB10}" type="datetimeFigureOut">
               <a:rPr lang="de-DE" smtClean="0"/>
-              <a:t>10.09.2020</a:t>
+              <a:t>11.09.2020</a:t>
             </a:fld>
             <a:endParaRPr lang="de-DE"/>
           </a:p>
@@ -3626,7 +3626,7 @@
           <a:p>
             <a:fld id="{0652E80E-B1F5-4805-9AD7-A46BA932CB10}" type="datetimeFigureOut">
               <a:rPr lang="de-DE" smtClean="0"/>
-              <a:t>10.09.2020</a:t>
+              <a:t>11.09.2020</a:t>
             </a:fld>
             <a:endParaRPr lang="de-DE"/>
           </a:p>
@@ -3901,7 +3901,7 @@
           <a:p>
             <a:fld id="{0652E80E-B1F5-4805-9AD7-A46BA932CB10}" type="datetimeFigureOut">
               <a:rPr lang="de-DE" smtClean="0"/>
-              <a:t>10.09.2020</a:t>
+              <a:t>11.09.2020</a:t>
             </a:fld>
             <a:endParaRPr lang="de-DE"/>
           </a:p>
@@ -4166,7 +4166,7 @@
           <a:p>
             <a:fld id="{0652E80E-B1F5-4805-9AD7-A46BA932CB10}" type="datetimeFigureOut">
               <a:rPr lang="de-DE" smtClean="0"/>
-              <a:t>10.09.2020</a:t>
+              <a:t>11.09.2020</a:t>
             </a:fld>
             <a:endParaRPr lang="de-DE"/>
           </a:p>
@@ -4578,7 +4578,7 @@
           <a:p>
             <a:fld id="{0652E80E-B1F5-4805-9AD7-A46BA932CB10}" type="datetimeFigureOut">
               <a:rPr lang="de-DE" smtClean="0"/>
-              <a:t>10.09.2020</a:t>
+              <a:t>11.09.2020</a:t>
             </a:fld>
             <a:endParaRPr lang="de-DE"/>
           </a:p>
@@ -4719,7 +4719,7 @@
           <a:p>
             <a:fld id="{0652E80E-B1F5-4805-9AD7-A46BA932CB10}" type="datetimeFigureOut">
               <a:rPr lang="de-DE" smtClean="0"/>
-              <a:t>10.09.2020</a:t>
+              <a:t>11.09.2020</a:t>
             </a:fld>
             <a:endParaRPr lang="de-DE"/>
           </a:p>
@@ -4832,7 +4832,7 @@
           <a:p>
             <a:fld id="{0652E80E-B1F5-4805-9AD7-A46BA932CB10}" type="datetimeFigureOut">
               <a:rPr lang="de-DE" smtClean="0"/>
-              <a:t>10.09.2020</a:t>
+              <a:t>11.09.2020</a:t>
             </a:fld>
             <a:endParaRPr lang="de-DE"/>
           </a:p>
@@ -5143,7 +5143,7 @@
           <a:p>
             <a:fld id="{0652E80E-B1F5-4805-9AD7-A46BA932CB10}" type="datetimeFigureOut">
               <a:rPr lang="de-DE" smtClean="0"/>
-              <a:t>10.09.2020</a:t>
+              <a:t>11.09.2020</a:t>
             </a:fld>
             <a:endParaRPr lang="de-DE"/>
           </a:p>
@@ -5431,7 +5431,7 @@
           <a:p>
             <a:fld id="{0652E80E-B1F5-4805-9AD7-A46BA932CB10}" type="datetimeFigureOut">
               <a:rPr lang="de-DE" smtClean="0"/>
-              <a:t>10.09.2020</a:t>
+              <a:t>11.09.2020</a:t>
             </a:fld>
             <a:endParaRPr lang="de-DE"/>
           </a:p>
@@ -5672,7 +5672,7 @@
           <a:p>
             <a:fld id="{0652E80E-B1F5-4805-9AD7-A46BA932CB10}" type="datetimeFigureOut">
               <a:rPr lang="de-DE" smtClean="0"/>
-              <a:t>10.09.2020</a:t>
+              <a:t>11.09.2020</a:t>
             </a:fld>
             <a:endParaRPr lang="de-DE"/>
           </a:p>
@@ -6104,7 +6104,7 @@
           <p:nvPr>
             <p:extLst>
               <p:ext uri="{D42A27DB-BD31-4B8C-83A1-F6EECF244321}">
-                <p14:modId xmlns:p14="http://schemas.microsoft.com/office/powerpoint/2010/main" val="3251299121"/>
+                <p14:modId xmlns:p14="http://schemas.microsoft.com/office/powerpoint/2010/main" val="1870351030"/>
               </p:ext>
             </p:extLst>
           </p:nvPr>
@@ -6760,6 +6760,102 @@
           <a:chExt cx="0" cy="0"/>
         </a:xfrm>
       </p:grpSpPr>
+      <p:sp>
+        <p:nvSpPr>
+          <p:cNvPr id="3" name="Rechteck 2">
+            <a:extLst>
+              <a:ext uri="{FF2B5EF4-FFF2-40B4-BE49-F238E27FC236}">
+                <a16:creationId xmlns:a16="http://schemas.microsoft.com/office/drawing/2014/main" id="{FB9490F0-DF70-4E08-A81A-0B05F111ACBD}"/>
+              </a:ext>
+            </a:extLst>
+          </p:cNvPr>
+          <p:cNvSpPr/>
+          <p:nvPr/>
+        </p:nvSpPr>
+        <p:spPr>
+          <a:xfrm>
+            <a:off x="167779" y="2283931"/>
+            <a:ext cx="9882188" cy="2290137"/>
+          </a:xfrm>
+          <a:prstGeom prst="rect">
+            <a:avLst/>
+          </a:prstGeom>
+          <a:solidFill>
+            <a:srgbClr val="DBEBF8"/>
+          </a:solidFill>
+          <a:ln w="12700" cap="flat" cmpd="sng" algn="ctr">
+            <a:solidFill>
+              <a:srgbClr val="DBEBF8"/>
+            </a:solidFill>
+            <a:prstDash val="solid"/>
+            <a:miter lim="800000"/>
+          </a:ln>
+          <a:effectLst/>
+        </p:spPr>
+        <p:txBody>
+          <a:bodyPr spcFirstLastPara="0" vert="horz" wrap="square" lIns="106680" tIns="106680" rIns="106680" bIns="106680" numCol="1" spcCol="1270" anchor="ctr" anchorCtr="0">
+            <a:noAutofit/>
+          </a:bodyPr>
+          <a:lstStyle/>
+          <a:p>
+            <a:endParaRPr lang="de-DE"/>
+          </a:p>
+        </p:txBody>
+      </p:sp>
+      <p:sp>
+        <p:nvSpPr>
+          <p:cNvPr id="2" name="Rechteck 1">
+            <a:extLst>
+              <a:ext uri="{FF2B5EF4-FFF2-40B4-BE49-F238E27FC236}">
+                <a16:creationId xmlns:a16="http://schemas.microsoft.com/office/drawing/2014/main" id="{F00CBEB0-737B-48F8-97E8-882E26BD2FB4}"/>
+              </a:ext>
+            </a:extLst>
+          </p:cNvPr>
+          <p:cNvSpPr/>
+          <p:nvPr/>
+        </p:nvSpPr>
+        <p:spPr>
+          <a:xfrm>
+            <a:off x="167779" y="801878"/>
+            <a:ext cx="9882188" cy="1482053"/>
+          </a:xfrm>
+          <a:prstGeom prst="rect">
+            <a:avLst/>
+          </a:prstGeom>
+          <a:solidFill>
+            <a:srgbClr val="BFBFBF">
+              <a:alpha val="50196"/>
+            </a:srgbClr>
+          </a:solidFill>
+          <a:ln>
+            <a:noFill/>
+          </a:ln>
+        </p:spPr>
+        <p:style>
+          <a:lnRef idx="2">
+            <a:schemeClr val="accent1">
+              <a:shade val="50000"/>
+            </a:schemeClr>
+          </a:lnRef>
+          <a:fillRef idx="1">
+            <a:schemeClr val="accent1"/>
+          </a:fillRef>
+          <a:effectRef idx="0">
+            <a:schemeClr val="accent1"/>
+          </a:effectRef>
+          <a:fontRef idx="minor">
+            <a:schemeClr val="lt1"/>
+          </a:fontRef>
+        </p:style>
+        <p:txBody>
+          <a:bodyPr rtlCol="0" anchor="ctr"/>
+          <a:lstStyle/>
+          <a:p>
+            <a:pPr algn="ctr"/>
+            <a:endParaRPr lang="de-DE"/>
+          </a:p>
+        </p:txBody>
+      </p:sp>
       <p:grpSp>
         <p:nvGrpSpPr>
           <p:cNvPr id="41" name="Gruppieren 40">
@@ -7276,120 +7372,6 @@
           </a:fontRef>
         </p:style>
       </p:cxnSp>
-      <p:sp>
-        <p:nvSpPr>
-          <p:cNvPr id="31" name="Rechteck 30">
-            <a:extLst>
-              <a:ext uri="{FF2B5EF4-FFF2-40B4-BE49-F238E27FC236}">
-                <a16:creationId xmlns:a16="http://schemas.microsoft.com/office/drawing/2014/main" id="{69BA51E3-1EC6-4311-A04A-F6F8EF84449A}"/>
-              </a:ext>
-            </a:extLst>
-          </p:cNvPr>
-          <p:cNvSpPr/>
-          <p:nvPr/>
-        </p:nvSpPr>
-        <p:spPr>
-          <a:xfrm>
-            <a:off x="167779" y="1390078"/>
-            <a:ext cx="1887524" cy="285155"/>
-          </a:xfrm>
-          <a:prstGeom prst="rect">
-            <a:avLst/>
-          </a:prstGeom>
-          <a:noFill/>
-          <a:ln>
-            <a:prstDash val="sysDash"/>
-          </a:ln>
-        </p:spPr>
-        <p:style>
-          <a:lnRef idx="2">
-            <a:schemeClr val="accent1">
-              <a:shade val="50000"/>
-            </a:schemeClr>
-          </a:lnRef>
-          <a:fillRef idx="1">
-            <a:schemeClr val="accent1"/>
-          </a:fillRef>
-          <a:effectRef idx="0">
-            <a:schemeClr val="accent1"/>
-          </a:effectRef>
-          <a:fontRef idx="minor">
-            <a:schemeClr val="lt1"/>
-          </a:fontRef>
-        </p:style>
-        <p:txBody>
-          <a:bodyPr rtlCol="0" anchor="ctr"/>
-          <a:lstStyle/>
-          <a:p>
-            <a:pPr algn="ctr"/>
-            <a:r>
-              <a:rPr lang="de-DE" sz="1200" dirty="0">
-                <a:solidFill>
-                  <a:schemeClr val="tx1"/>
-                </a:solidFill>
-              </a:rPr>
-              <a:t>1.. Offline Motion Planning</a:t>
-            </a:r>
-          </a:p>
-        </p:txBody>
-      </p:sp>
-      <p:sp>
-        <p:nvSpPr>
-          <p:cNvPr id="33" name="Rechteck 32">
-            <a:extLst>
-              <a:ext uri="{FF2B5EF4-FFF2-40B4-BE49-F238E27FC236}">
-                <a16:creationId xmlns:a16="http://schemas.microsoft.com/office/drawing/2014/main" id="{D764011D-D384-4BE2-B6CD-C65EC1B6C749}"/>
-              </a:ext>
-            </a:extLst>
-          </p:cNvPr>
-          <p:cNvSpPr/>
-          <p:nvPr/>
-        </p:nvSpPr>
-        <p:spPr>
-          <a:xfrm>
-            <a:off x="167779" y="3289976"/>
-            <a:ext cx="1887524" cy="285155"/>
-          </a:xfrm>
-          <a:prstGeom prst="rect">
-            <a:avLst/>
-          </a:prstGeom>
-          <a:noFill/>
-          <a:ln>
-            <a:prstDash val="sysDash"/>
-          </a:ln>
-        </p:spPr>
-        <p:style>
-          <a:lnRef idx="2">
-            <a:schemeClr val="accent1">
-              <a:shade val="50000"/>
-            </a:schemeClr>
-          </a:lnRef>
-          <a:fillRef idx="1">
-            <a:schemeClr val="accent1"/>
-          </a:fillRef>
-          <a:effectRef idx="0">
-            <a:schemeClr val="accent1"/>
-          </a:effectRef>
-          <a:fontRef idx="minor">
-            <a:schemeClr val="lt1"/>
-          </a:fontRef>
-        </p:style>
-        <p:txBody>
-          <a:bodyPr rtlCol="0" anchor="ctr"/>
-          <a:lstStyle/>
-          <a:p>
-            <a:pPr algn="ctr"/>
-            <a:r>
-              <a:rPr lang="de-DE" sz="1200" dirty="0">
-                <a:solidFill>
-                  <a:schemeClr val="tx1"/>
-                </a:solidFill>
-              </a:rPr>
-              <a:t>2. Online Stabilization</a:t>
-            </a:r>
-          </a:p>
-        </p:txBody>
-      </p:sp>
       <p:pic>
         <p:nvPicPr>
           <p:cNvPr id="64" name="Grafik 63">
@@ -7696,6 +7678,174 @@
           </a:fontRef>
         </p:style>
       </p:cxnSp>
+      <p:cxnSp>
+        <p:nvCxnSpPr>
+          <p:cNvPr id="5" name="Gerader Verbinder 4">
+            <a:extLst>
+              <a:ext uri="{FF2B5EF4-FFF2-40B4-BE49-F238E27FC236}">
+                <a16:creationId xmlns:a16="http://schemas.microsoft.com/office/drawing/2014/main" id="{4C4DEF21-6362-4836-9A43-6F653251D75B}"/>
+              </a:ext>
+            </a:extLst>
+          </p:cNvPr>
+          <p:cNvCxnSpPr>
+            <a:cxnSpLocks/>
+          </p:cNvCxnSpPr>
+          <p:nvPr/>
+        </p:nvCxnSpPr>
+        <p:spPr>
+          <a:xfrm flipH="1">
+            <a:off x="167779" y="2283931"/>
+            <a:ext cx="9882188" cy="0"/>
+          </a:xfrm>
+          <a:prstGeom prst="line">
+            <a:avLst/>
+          </a:prstGeom>
+          <a:ln>
+            <a:solidFill>
+              <a:schemeClr val="tx1"/>
+            </a:solidFill>
+            <a:prstDash val="dash"/>
+          </a:ln>
+        </p:spPr>
+        <p:style>
+          <a:lnRef idx="1">
+            <a:schemeClr val="accent1"/>
+          </a:lnRef>
+          <a:fillRef idx="0">
+            <a:schemeClr val="accent1"/>
+          </a:fillRef>
+          <a:effectRef idx="0">
+            <a:schemeClr val="accent1"/>
+          </a:effectRef>
+          <a:fontRef idx="minor">
+            <a:schemeClr val="tx1"/>
+          </a:fontRef>
+        </p:style>
+      </p:cxnSp>
+      <p:sp>
+        <p:nvSpPr>
+          <p:cNvPr id="32" name="Textfeld 31">
+            <a:extLst>
+              <a:ext uri="{FF2B5EF4-FFF2-40B4-BE49-F238E27FC236}">
+                <a16:creationId xmlns:a16="http://schemas.microsoft.com/office/drawing/2014/main" id="{3A213B45-6765-452C-BDA4-91DE2609C697}"/>
+              </a:ext>
+            </a:extLst>
+          </p:cNvPr>
+          <p:cNvSpPr txBox="1"/>
+          <p:nvPr/>
+        </p:nvSpPr>
+        <p:spPr>
+          <a:xfrm>
+            <a:off x="167779" y="801877"/>
+            <a:ext cx="1812023" cy="276999"/>
+          </a:xfrm>
+          <a:prstGeom prst="rect">
+            <a:avLst/>
+          </a:prstGeom>
+          <a:noFill/>
+        </p:spPr>
+        <p:txBody>
+          <a:bodyPr wrap="square">
+            <a:spAutoFit/>
+          </a:bodyPr>
+          <a:lstStyle/>
+          <a:p>
+            <a:pPr algn="ctr"/>
+            <a:r>
+              <a:rPr lang="de-DE" sz="1200" dirty="0">
+                <a:solidFill>
+                  <a:schemeClr val="tx1">
+                    <a:lumMod val="50000"/>
+                    <a:lumOff val="50000"/>
+                  </a:schemeClr>
+                </a:solidFill>
+              </a:rPr>
+              <a:t>1. Offline Motion </a:t>
+            </a:r>
+            <a:r>
+              <a:rPr lang="de-DE" sz="1200" dirty="0" err="1">
+                <a:solidFill>
+                  <a:schemeClr val="tx1">
+                    <a:lumMod val="50000"/>
+                    <a:lumOff val="50000"/>
+                  </a:schemeClr>
+                </a:solidFill>
+              </a:rPr>
+              <a:t>Planning</a:t>
+            </a:r>
+            <a:endParaRPr lang="de-DE" sz="1200" dirty="0">
+              <a:solidFill>
+                <a:schemeClr val="tx1">
+                  <a:lumMod val="50000"/>
+                  <a:lumOff val="50000"/>
+                </a:schemeClr>
+              </a:solidFill>
+            </a:endParaRPr>
+          </a:p>
+        </p:txBody>
+      </p:sp>
+      <p:sp>
+        <p:nvSpPr>
+          <p:cNvPr id="34" name="Textfeld 33">
+            <a:extLst>
+              <a:ext uri="{FF2B5EF4-FFF2-40B4-BE49-F238E27FC236}">
+                <a16:creationId xmlns:a16="http://schemas.microsoft.com/office/drawing/2014/main" id="{6A894EEE-B617-4069-A813-C182E39A663C}"/>
+              </a:ext>
+            </a:extLst>
+          </p:cNvPr>
+          <p:cNvSpPr txBox="1"/>
+          <p:nvPr/>
+        </p:nvSpPr>
+        <p:spPr>
+          <a:xfrm>
+            <a:off x="167779" y="2277255"/>
+            <a:ext cx="1555066" cy="276999"/>
+          </a:xfrm>
+          <a:prstGeom prst="rect">
+            <a:avLst/>
+          </a:prstGeom>
+          <a:noFill/>
+        </p:spPr>
+        <p:txBody>
+          <a:bodyPr wrap="square">
+            <a:spAutoFit/>
+          </a:bodyPr>
+          <a:lstStyle/>
+          <a:p>
+            <a:pPr algn="ctr"/>
+            <a:r>
+              <a:rPr lang="de-DE" sz="1200" dirty="0">
+                <a:solidFill>
+                  <a:schemeClr val="tx1">
+                    <a:lumMod val="50000"/>
+                    <a:lumOff val="50000"/>
+                  </a:schemeClr>
+                </a:solidFill>
+              </a:rPr>
+              <a:t>2. Online </a:t>
+            </a:r>
+            <a:r>
+              <a:rPr lang="de-DE" sz="1200" dirty="0" err="1">
+                <a:solidFill>
+                  <a:schemeClr val="tx1">
+                    <a:lumMod val="50000"/>
+                    <a:lumOff val="50000"/>
+                  </a:schemeClr>
+                </a:solidFill>
+              </a:rPr>
+              <a:t>Stabilization</a:t>
+            </a:r>
+            <a:endParaRPr lang="de-DE" sz="1200" dirty="0">
+              <a:solidFill>
+                <a:schemeClr val="tx1">
+                  <a:lumMod val="50000"/>
+                  <a:lumOff val="50000"/>
+                </a:schemeClr>
+              </a:solidFill>
+            </a:endParaRPr>
+          </a:p>
+        </p:txBody>
+      </p:sp>
     </p:spTree>
     <p:extLst>
       <p:ext uri="{BB962C8B-B14F-4D97-AF65-F5344CB8AC3E}">

</xml_diff>

<commit_message>
Integrated recommendations from Shivesh and Jan
</commit_message>
<xml_diff>
--- a/img/pptGraphs.pptx
+++ b/img/pptGraphs.pptx
@@ -13,6 +13,7 @@
     <p:sldId id="261" r:id="rId7"/>
     <p:sldId id="262" r:id="rId8"/>
     <p:sldId id="263" r:id="rId9"/>
+    <p:sldId id="264" r:id="rId10"/>
   </p:sldIdLst>
   <p:sldSz cx="12192000" cy="6858000"/>
   <p:notesSz cx="6858000" cy="9144000"/>
@@ -3027,7 +3028,7 @@
           <a:p>
             <a:fld id="{0652E80E-B1F5-4805-9AD7-A46BA932CB10}" type="datetimeFigureOut">
               <a:rPr lang="de-DE" smtClean="0"/>
-              <a:t>15.09.2020</a:t>
+              <a:t>16.09.2020</a:t>
             </a:fld>
             <a:endParaRPr lang="de-DE"/>
           </a:p>
@@ -3225,7 +3226,7 @@
           <a:p>
             <a:fld id="{0652E80E-B1F5-4805-9AD7-A46BA932CB10}" type="datetimeFigureOut">
               <a:rPr lang="de-DE" smtClean="0"/>
-              <a:t>15.09.2020</a:t>
+              <a:t>16.09.2020</a:t>
             </a:fld>
             <a:endParaRPr lang="de-DE"/>
           </a:p>
@@ -3433,7 +3434,7 @@
           <a:p>
             <a:fld id="{0652E80E-B1F5-4805-9AD7-A46BA932CB10}" type="datetimeFigureOut">
               <a:rPr lang="de-DE" smtClean="0"/>
-              <a:t>15.09.2020</a:t>
+              <a:t>16.09.2020</a:t>
             </a:fld>
             <a:endParaRPr lang="de-DE"/>
           </a:p>
@@ -3631,7 +3632,7 @@
           <a:p>
             <a:fld id="{0652E80E-B1F5-4805-9AD7-A46BA932CB10}" type="datetimeFigureOut">
               <a:rPr lang="de-DE" smtClean="0"/>
-              <a:t>15.09.2020</a:t>
+              <a:t>16.09.2020</a:t>
             </a:fld>
             <a:endParaRPr lang="de-DE"/>
           </a:p>
@@ -3906,7 +3907,7 @@
           <a:p>
             <a:fld id="{0652E80E-B1F5-4805-9AD7-A46BA932CB10}" type="datetimeFigureOut">
               <a:rPr lang="de-DE" smtClean="0"/>
-              <a:t>15.09.2020</a:t>
+              <a:t>16.09.2020</a:t>
             </a:fld>
             <a:endParaRPr lang="de-DE"/>
           </a:p>
@@ -4171,7 +4172,7 @@
           <a:p>
             <a:fld id="{0652E80E-B1F5-4805-9AD7-A46BA932CB10}" type="datetimeFigureOut">
               <a:rPr lang="de-DE" smtClean="0"/>
-              <a:t>15.09.2020</a:t>
+              <a:t>16.09.2020</a:t>
             </a:fld>
             <a:endParaRPr lang="de-DE"/>
           </a:p>
@@ -4583,7 +4584,7 @@
           <a:p>
             <a:fld id="{0652E80E-B1F5-4805-9AD7-A46BA932CB10}" type="datetimeFigureOut">
               <a:rPr lang="de-DE" smtClean="0"/>
-              <a:t>15.09.2020</a:t>
+              <a:t>16.09.2020</a:t>
             </a:fld>
             <a:endParaRPr lang="de-DE"/>
           </a:p>
@@ -4724,7 +4725,7 @@
           <a:p>
             <a:fld id="{0652E80E-B1F5-4805-9AD7-A46BA932CB10}" type="datetimeFigureOut">
               <a:rPr lang="de-DE" smtClean="0"/>
-              <a:t>15.09.2020</a:t>
+              <a:t>16.09.2020</a:t>
             </a:fld>
             <a:endParaRPr lang="de-DE"/>
           </a:p>
@@ -4837,7 +4838,7 @@
           <a:p>
             <a:fld id="{0652E80E-B1F5-4805-9AD7-A46BA932CB10}" type="datetimeFigureOut">
               <a:rPr lang="de-DE" smtClean="0"/>
-              <a:t>15.09.2020</a:t>
+              <a:t>16.09.2020</a:t>
             </a:fld>
             <a:endParaRPr lang="de-DE"/>
           </a:p>
@@ -5148,7 +5149,7 @@
           <a:p>
             <a:fld id="{0652E80E-B1F5-4805-9AD7-A46BA932CB10}" type="datetimeFigureOut">
               <a:rPr lang="de-DE" smtClean="0"/>
-              <a:t>15.09.2020</a:t>
+              <a:t>16.09.2020</a:t>
             </a:fld>
             <a:endParaRPr lang="de-DE"/>
           </a:p>
@@ -5436,7 +5437,7 @@
           <a:p>
             <a:fld id="{0652E80E-B1F5-4805-9AD7-A46BA932CB10}" type="datetimeFigureOut">
               <a:rPr lang="de-DE" smtClean="0"/>
-              <a:t>15.09.2020</a:t>
+              <a:t>16.09.2020</a:t>
             </a:fld>
             <a:endParaRPr lang="de-DE"/>
           </a:p>
@@ -5677,7 +5678,7 @@
           <a:p>
             <a:fld id="{0652E80E-B1F5-4805-9AD7-A46BA932CB10}" type="datetimeFigureOut">
               <a:rPr lang="de-DE" smtClean="0"/>
-              <a:t>15.09.2020</a:t>
+              <a:t>16.09.2020</a:t>
             </a:fld>
             <a:endParaRPr lang="de-DE"/>
           </a:p>
@@ -13592,7 +13593,7 @@
                   <a:schemeClr val="tx1"/>
                 </a:solidFill>
               </a:rPr>
-              <a:t> Online </a:t>
+              <a:t> Validation </a:t>
             </a:r>
             <a:r>
               <a:rPr lang="de-DE" dirty="0" err="1">
@@ -13600,7 +13601,7 @@
                   <a:schemeClr val="tx1"/>
                 </a:solidFill>
               </a:rPr>
-              <a:t>Stabilization</a:t>
+              <a:t>of</a:t>
             </a:r>
             <a:r>
               <a:rPr lang="de-DE" dirty="0">
@@ -13609,22 +13610,6 @@
                 </a:solidFill>
               </a:rPr>
               <a:t> </a:t>
-            </a:r>
-            <a:r>
-              <a:rPr lang="de-DE" dirty="0" err="1">
-                <a:solidFill>
-                  <a:schemeClr val="tx1"/>
-                </a:solidFill>
-              </a:rPr>
-              <a:t>of</a:t>
-            </a:r>
-            <a:r>
-              <a:rPr lang="de-DE" dirty="0">
-                <a:solidFill>
-                  <a:schemeClr val="tx1"/>
-                </a:solidFill>
-              </a:rPr>
-              <a:t> the </a:t>
             </a:r>
             <a:r>
               <a:rPr lang="de-DE" dirty="0" err="1">
@@ -14724,6 +14709,1721 @@
     <p:extLst>
       <p:ext uri="{BB962C8B-B14F-4D97-AF65-F5344CB8AC3E}">
         <p14:creationId xmlns:p14="http://schemas.microsoft.com/office/powerpoint/2010/main" val="1775215435"/>
+      </p:ext>
+    </p:extLst>
+  </p:cSld>
+  <p:clrMapOvr>
+    <a:masterClrMapping/>
+  </p:clrMapOvr>
+</p:sld>
+</file>
+
+<file path=ppt/slides/slide9.xml><?xml version="1.0" encoding="utf-8"?>
+<p:sld xmlns:a="http://schemas.openxmlformats.org/drawingml/2006/main" xmlns:r="http://schemas.openxmlformats.org/officeDocument/2006/relationships" xmlns:p="http://schemas.openxmlformats.org/presentationml/2006/main">
+  <p:cSld>
+    <p:spTree>
+      <p:nvGrpSpPr>
+        <p:cNvPr id="1" name=""/>
+        <p:cNvGrpSpPr/>
+        <p:nvPr/>
+      </p:nvGrpSpPr>
+      <p:grpSpPr>
+        <a:xfrm>
+          <a:off x="0" y="0"/>
+          <a:ext cx="0" cy="0"/>
+          <a:chOff x="0" y="0"/>
+          <a:chExt cx="0" cy="0"/>
+        </a:xfrm>
+      </p:grpSpPr>
+      <p:sp>
+        <p:nvSpPr>
+          <p:cNvPr id="123" name="Rechteck 122">
+            <a:extLst>
+              <a:ext uri="{FF2B5EF4-FFF2-40B4-BE49-F238E27FC236}">
+                <a16:creationId xmlns:a16="http://schemas.microsoft.com/office/drawing/2014/main" id="{4AB9F450-A5AB-49CE-B304-66370177C652}"/>
+              </a:ext>
+            </a:extLst>
+          </p:cNvPr>
+          <p:cNvSpPr/>
+          <p:nvPr/>
+        </p:nvSpPr>
+        <p:spPr>
+          <a:xfrm>
+            <a:off x="2647950" y="3441721"/>
+            <a:ext cx="5734050" cy="796291"/>
+          </a:xfrm>
+          <a:prstGeom prst="rect">
+            <a:avLst/>
+          </a:prstGeom>
+          <a:solidFill>
+            <a:schemeClr val="bg1">
+              <a:lumMod val="85000"/>
+            </a:schemeClr>
+          </a:solidFill>
+          <a:ln w="19050">
+            <a:solidFill>
+              <a:schemeClr val="tx1"/>
+            </a:solidFill>
+          </a:ln>
+        </p:spPr>
+        <p:style>
+          <a:lnRef idx="2">
+            <a:schemeClr val="accent1">
+              <a:shade val="50000"/>
+            </a:schemeClr>
+          </a:lnRef>
+          <a:fillRef idx="1">
+            <a:schemeClr val="accent1"/>
+          </a:fillRef>
+          <a:effectRef idx="0">
+            <a:schemeClr val="accent1"/>
+          </a:effectRef>
+          <a:fontRef idx="minor">
+            <a:schemeClr val="lt1"/>
+          </a:fontRef>
+        </p:style>
+        <p:txBody>
+          <a:bodyPr rtlCol="0" anchor="ctr"/>
+          <a:lstStyle/>
+          <a:p>
+            <a:r>
+              <a:rPr lang="de-DE" dirty="0" err="1">
+                <a:solidFill>
+                  <a:schemeClr val="tx1"/>
+                </a:solidFill>
+              </a:rPr>
+              <a:t>Planning</a:t>
+            </a:r>
+            <a:endParaRPr lang="de-DE" dirty="0">
+              <a:solidFill>
+                <a:schemeClr val="tx1"/>
+              </a:solidFill>
+            </a:endParaRPr>
+          </a:p>
+        </p:txBody>
+      </p:sp>
+      <p:sp>
+        <p:nvSpPr>
+          <p:cNvPr id="125" name="Rechteck 124">
+            <a:extLst>
+              <a:ext uri="{FF2B5EF4-FFF2-40B4-BE49-F238E27FC236}">
+                <a16:creationId xmlns:a16="http://schemas.microsoft.com/office/drawing/2014/main" id="{640E39D3-2F67-43CE-AACB-CBBD06B83170}"/>
+              </a:ext>
+            </a:extLst>
+          </p:cNvPr>
+          <p:cNvSpPr/>
+          <p:nvPr/>
+        </p:nvSpPr>
+        <p:spPr>
+          <a:xfrm>
+            <a:off x="2647950" y="4510247"/>
+            <a:ext cx="5734050" cy="796291"/>
+          </a:xfrm>
+          <a:prstGeom prst="rect">
+            <a:avLst/>
+          </a:prstGeom>
+          <a:solidFill>
+            <a:schemeClr val="bg1">
+              <a:lumMod val="85000"/>
+            </a:schemeClr>
+          </a:solidFill>
+          <a:ln w="19050">
+            <a:solidFill>
+              <a:schemeClr val="tx1"/>
+            </a:solidFill>
+          </a:ln>
+        </p:spPr>
+        <p:style>
+          <a:lnRef idx="2">
+            <a:schemeClr val="accent1">
+              <a:shade val="50000"/>
+            </a:schemeClr>
+          </a:lnRef>
+          <a:fillRef idx="1">
+            <a:schemeClr val="accent1"/>
+          </a:fillRef>
+          <a:effectRef idx="0">
+            <a:schemeClr val="accent1"/>
+          </a:effectRef>
+          <a:fontRef idx="minor">
+            <a:schemeClr val="lt1"/>
+          </a:fontRef>
+        </p:style>
+        <p:txBody>
+          <a:bodyPr rtlCol="0" anchor="ctr"/>
+          <a:lstStyle/>
+          <a:p>
+            <a:r>
+              <a:rPr lang="de-DE" dirty="0">
+                <a:solidFill>
+                  <a:schemeClr val="tx1"/>
+                </a:solidFill>
+              </a:rPr>
+              <a:t>Control</a:t>
+            </a:r>
+          </a:p>
+        </p:txBody>
+      </p:sp>
+      <p:sp>
+        <p:nvSpPr>
+          <p:cNvPr id="127" name="Rechteck 126">
+            <a:extLst>
+              <a:ext uri="{FF2B5EF4-FFF2-40B4-BE49-F238E27FC236}">
+                <a16:creationId xmlns:a16="http://schemas.microsoft.com/office/drawing/2014/main" id="{D5A8F084-967E-46E8-9116-E70C933ADB67}"/>
+              </a:ext>
+            </a:extLst>
+          </p:cNvPr>
+          <p:cNvSpPr/>
+          <p:nvPr/>
+        </p:nvSpPr>
+        <p:spPr>
+          <a:xfrm>
+            <a:off x="2647950" y="2371177"/>
+            <a:ext cx="5734050" cy="796291"/>
+          </a:xfrm>
+          <a:prstGeom prst="rect">
+            <a:avLst/>
+          </a:prstGeom>
+          <a:solidFill>
+            <a:schemeClr val="bg1">
+              <a:lumMod val="85000"/>
+            </a:schemeClr>
+          </a:solidFill>
+          <a:ln w="19050">
+            <a:solidFill>
+              <a:schemeClr val="tx1"/>
+            </a:solidFill>
+          </a:ln>
+        </p:spPr>
+        <p:style>
+          <a:lnRef idx="2">
+            <a:schemeClr val="accent1">
+              <a:shade val="50000"/>
+            </a:schemeClr>
+          </a:lnRef>
+          <a:fillRef idx="1">
+            <a:schemeClr val="accent1"/>
+          </a:fillRef>
+          <a:effectRef idx="0">
+            <a:schemeClr val="accent1"/>
+          </a:effectRef>
+          <a:fontRef idx="minor">
+            <a:schemeClr val="lt1"/>
+          </a:fontRef>
+        </p:style>
+        <p:txBody>
+          <a:bodyPr rtlCol="0" anchor="ctr"/>
+          <a:lstStyle/>
+          <a:p>
+            <a:r>
+              <a:rPr lang="de-DE" dirty="0">
+                <a:solidFill>
+                  <a:schemeClr val="tx1"/>
+                </a:solidFill>
+              </a:rPr>
+              <a:t>Approach</a:t>
+            </a:r>
+            <a:endParaRPr lang="de-DE" sz="1100" dirty="0">
+              <a:solidFill>
+                <a:schemeClr val="tx1"/>
+              </a:solidFill>
+            </a:endParaRPr>
+          </a:p>
+        </p:txBody>
+      </p:sp>
+      <p:sp>
+        <p:nvSpPr>
+          <p:cNvPr id="17" name="Rechteck 16">
+            <a:extLst>
+              <a:ext uri="{FF2B5EF4-FFF2-40B4-BE49-F238E27FC236}">
+                <a16:creationId xmlns:a16="http://schemas.microsoft.com/office/drawing/2014/main" id="{F5F2B274-EAD7-45C6-96E9-A0A430356AC2}"/>
+              </a:ext>
+            </a:extLst>
+          </p:cNvPr>
+          <p:cNvSpPr/>
+          <p:nvPr/>
+        </p:nvSpPr>
+        <p:spPr>
+          <a:xfrm>
+            <a:off x="2647950" y="1304307"/>
+            <a:ext cx="5734050" cy="796291"/>
+          </a:xfrm>
+          <a:prstGeom prst="rect">
+            <a:avLst/>
+          </a:prstGeom>
+          <a:solidFill>
+            <a:schemeClr val="bg1">
+              <a:lumMod val="85000"/>
+            </a:schemeClr>
+          </a:solidFill>
+          <a:ln w="19050">
+            <a:solidFill>
+              <a:schemeClr val="tx1"/>
+            </a:solidFill>
+          </a:ln>
+        </p:spPr>
+        <p:style>
+          <a:lnRef idx="2">
+            <a:schemeClr val="accent1">
+              <a:shade val="50000"/>
+            </a:schemeClr>
+          </a:lnRef>
+          <a:fillRef idx="1">
+            <a:schemeClr val="accent1"/>
+          </a:fillRef>
+          <a:effectRef idx="0">
+            <a:schemeClr val="accent1"/>
+          </a:effectRef>
+          <a:fontRef idx="minor">
+            <a:schemeClr val="lt1"/>
+          </a:fontRef>
+        </p:style>
+        <p:txBody>
+          <a:bodyPr rtlCol="0" anchor="ctr"/>
+          <a:lstStyle/>
+          <a:p>
+            <a:r>
+              <a:rPr lang="de-DE" dirty="0">
+                <a:solidFill>
+                  <a:schemeClr val="tx1"/>
+                </a:solidFill>
+              </a:rPr>
+              <a:t>Research</a:t>
+            </a:r>
+            <a:endParaRPr lang="de-DE" sz="1100" dirty="0">
+              <a:solidFill>
+                <a:schemeClr val="tx1"/>
+              </a:solidFill>
+            </a:endParaRPr>
+          </a:p>
+        </p:txBody>
+      </p:sp>
+      <p:sp>
+        <p:nvSpPr>
+          <p:cNvPr id="21" name="Rechteck 20">
+            <a:extLst>
+              <a:ext uri="{FF2B5EF4-FFF2-40B4-BE49-F238E27FC236}">
+                <a16:creationId xmlns:a16="http://schemas.microsoft.com/office/drawing/2014/main" id="{61DFCBF2-B2A5-429E-B2E1-3C89ACCA4C69}"/>
+              </a:ext>
+            </a:extLst>
+          </p:cNvPr>
+          <p:cNvSpPr/>
+          <p:nvPr/>
+        </p:nvSpPr>
+        <p:spPr>
+          <a:xfrm>
+            <a:off x="2647950" y="5572618"/>
+            <a:ext cx="5734050" cy="796291"/>
+          </a:xfrm>
+          <a:prstGeom prst="rect">
+            <a:avLst/>
+          </a:prstGeom>
+          <a:solidFill>
+            <a:schemeClr val="bg1">
+              <a:lumMod val="85000"/>
+            </a:schemeClr>
+          </a:solidFill>
+          <a:ln w="19050">
+            <a:solidFill>
+              <a:schemeClr val="tx1"/>
+            </a:solidFill>
+          </a:ln>
+        </p:spPr>
+        <p:style>
+          <a:lnRef idx="2">
+            <a:schemeClr val="accent1">
+              <a:shade val="50000"/>
+            </a:schemeClr>
+          </a:lnRef>
+          <a:fillRef idx="1">
+            <a:schemeClr val="accent1"/>
+          </a:fillRef>
+          <a:effectRef idx="0">
+            <a:schemeClr val="accent1"/>
+          </a:effectRef>
+          <a:fontRef idx="minor">
+            <a:schemeClr val="lt1"/>
+          </a:fontRef>
+        </p:style>
+        <p:txBody>
+          <a:bodyPr rtlCol="0" anchor="ctr"/>
+          <a:lstStyle/>
+          <a:p>
+            <a:r>
+              <a:rPr lang="de-DE" dirty="0" err="1">
+                <a:solidFill>
+                  <a:schemeClr val="tx1"/>
+                </a:solidFill>
+              </a:rPr>
+              <a:t>Conclusion</a:t>
+            </a:r>
+            <a:endParaRPr lang="de-DE" dirty="0">
+              <a:solidFill>
+                <a:schemeClr val="tx1"/>
+              </a:solidFill>
+            </a:endParaRPr>
+          </a:p>
+        </p:txBody>
+      </p:sp>
+      <p:sp>
+        <p:nvSpPr>
+          <p:cNvPr id="22" name="Rechteck 21">
+            <a:extLst>
+              <a:ext uri="{FF2B5EF4-FFF2-40B4-BE49-F238E27FC236}">
+                <a16:creationId xmlns:a16="http://schemas.microsoft.com/office/drawing/2014/main" id="{F54B648E-DD07-4296-BDDF-0ED35F7A1C92}"/>
+              </a:ext>
+            </a:extLst>
+          </p:cNvPr>
+          <p:cNvSpPr/>
+          <p:nvPr/>
+        </p:nvSpPr>
+        <p:spPr>
+          <a:xfrm>
+            <a:off x="8778951" y="2371177"/>
+            <a:ext cx="2300767" cy="2935361"/>
+          </a:xfrm>
+          <a:prstGeom prst="rect">
+            <a:avLst/>
+          </a:prstGeom>
+          <a:solidFill>
+            <a:schemeClr val="bg1">
+              <a:lumMod val="85000"/>
+            </a:schemeClr>
+          </a:solidFill>
+          <a:ln w="19050">
+            <a:solidFill>
+              <a:schemeClr val="tx1"/>
+            </a:solidFill>
+          </a:ln>
+        </p:spPr>
+        <p:style>
+          <a:lnRef idx="2">
+            <a:schemeClr val="accent1">
+              <a:shade val="50000"/>
+            </a:schemeClr>
+          </a:lnRef>
+          <a:fillRef idx="1">
+            <a:schemeClr val="accent1"/>
+          </a:fillRef>
+          <a:effectRef idx="0">
+            <a:schemeClr val="accent1"/>
+          </a:effectRef>
+          <a:fontRef idx="minor">
+            <a:schemeClr val="lt1"/>
+          </a:fontRef>
+        </p:style>
+        <p:txBody>
+          <a:bodyPr rtlCol="0" anchor="ctr"/>
+          <a:lstStyle/>
+          <a:p>
+            <a:pPr algn="ctr"/>
+            <a:endParaRPr lang="de-DE" sz="1400" dirty="0">
+              <a:solidFill>
+                <a:schemeClr val="tx1"/>
+              </a:solidFill>
+            </a:endParaRPr>
+          </a:p>
+          <a:p>
+            <a:pPr algn="ctr"/>
+            <a:r>
+              <a:rPr lang="de-DE" dirty="0">
+                <a:solidFill>
+                  <a:schemeClr val="tx1"/>
+                </a:solidFill>
+              </a:rPr>
+              <a:t>Appendix</a:t>
+            </a:r>
+            <a:endParaRPr lang="de-DE" sz="1400" dirty="0">
+              <a:solidFill>
+                <a:schemeClr val="tx1"/>
+              </a:solidFill>
+            </a:endParaRPr>
+          </a:p>
+        </p:txBody>
+      </p:sp>
+      <p:sp>
+        <p:nvSpPr>
+          <p:cNvPr id="4" name="Rechteck 3">
+            <a:extLst>
+              <a:ext uri="{FF2B5EF4-FFF2-40B4-BE49-F238E27FC236}">
+                <a16:creationId xmlns:a16="http://schemas.microsoft.com/office/drawing/2014/main" id="{4D880AAB-7C26-4466-A794-626D7C86C1ED}"/>
+              </a:ext>
+            </a:extLst>
+          </p:cNvPr>
+          <p:cNvSpPr/>
+          <p:nvPr/>
+        </p:nvSpPr>
+        <p:spPr>
+          <a:xfrm>
+            <a:off x="3947162" y="1396865"/>
+            <a:ext cx="1883184" cy="582932"/>
+          </a:xfrm>
+          <a:prstGeom prst="rect">
+            <a:avLst/>
+          </a:prstGeom>
+          <a:solidFill>
+            <a:schemeClr val="bg1"/>
+          </a:solidFill>
+          <a:ln w="19050">
+            <a:solidFill>
+              <a:schemeClr val="tx1"/>
+            </a:solidFill>
+          </a:ln>
+        </p:spPr>
+        <p:style>
+          <a:lnRef idx="2">
+            <a:schemeClr val="accent1">
+              <a:shade val="50000"/>
+            </a:schemeClr>
+          </a:lnRef>
+          <a:fillRef idx="1">
+            <a:schemeClr val="accent1"/>
+          </a:fillRef>
+          <a:effectRef idx="0">
+            <a:schemeClr val="accent1"/>
+          </a:effectRef>
+          <a:fontRef idx="minor">
+            <a:schemeClr val="lt1"/>
+          </a:fontRef>
+        </p:style>
+        <p:txBody>
+          <a:bodyPr rtlCol="0" anchor="ctr"/>
+          <a:lstStyle/>
+          <a:p>
+            <a:pPr algn="ctr"/>
+            <a:r>
+              <a:rPr lang="de-DE" b="1" dirty="0">
+                <a:solidFill>
+                  <a:schemeClr val="tx1"/>
+                </a:solidFill>
+              </a:rPr>
+              <a:t>1</a:t>
+            </a:r>
+            <a:r>
+              <a:rPr lang="de-DE" dirty="0">
+                <a:solidFill>
+                  <a:schemeClr val="tx1"/>
+                </a:solidFill>
+              </a:rPr>
+              <a:t> Introduction</a:t>
+            </a:r>
+          </a:p>
+        </p:txBody>
+      </p:sp>
+      <p:sp>
+        <p:nvSpPr>
+          <p:cNvPr id="6" name="Rechteck 5">
+            <a:extLst>
+              <a:ext uri="{FF2B5EF4-FFF2-40B4-BE49-F238E27FC236}">
+                <a16:creationId xmlns:a16="http://schemas.microsoft.com/office/drawing/2014/main" id="{3D63AD59-56F6-4669-8701-84D285A1810A}"/>
+              </a:ext>
+            </a:extLst>
+          </p:cNvPr>
+          <p:cNvSpPr/>
+          <p:nvPr/>
+        </p:nvSpPr>
+        <p:spPr>
+          <a:xfrm>
+            <a:off x="6357699" y="1395926"/>
+            <a:ext cx="1887140" cy="582932"/>
+          </a:xfrm>
+          <a:prstGeom prst="rect">
+            <a:avLst/>
+          </a:prstGeom>
+          <a:solidFill>
+            <a:schemeClr val="bg1"/>
+          </a:solidFill>
+          <a:ln w="19050">
+            <a:solidFill>
+              <a:schemeClr val="tx1"/>
+            </a:solidFill>
+          </a:ln>
+        </p:spPr>
+        <p:style>
+          <a:lnRef idx="2">
+            <a:schemeClr val="accent1">
+              <a:shade val="50000"/>
+            </a:schemeClr>
+          </a:lnRef>
+          <a:fillRef idx="1">
+            <a:schemeClr val="accent1"/>
+          </a:fillRef>
+          <a:effectRef idx="0">
+            <a:schemeClr val="accent1"/>
+          </a:effectRef>
+          <a:fontRef idx="minor">
+            <a:schemeClr val="lt1"/>
+          </a:fontRef>
+        </p:style>
+        <p:txBody>
+          <a:bodyPr rtlCol="0" anchor="ctr"/>
+          <a:lstStyle/>
+          <a:p>
+            <a:pPr algn="ctr"/>
+            <a:r>
+              <a:rPr lang="de-DE" b="1" dirty="0">
+                <a:solidFill>
+                  <a:schemeClr val="tx1"/>
+                </a:solidFill>
+              </a:rPr>
+              <a:t>2</a:t>
+            </a:r>
+            <a:r>
+              <a:rPr lang="de-DE" dirty="0">
+                <a:solidFill>
+                  <a:schemeClr val="tx1"/>
+                </a:solidFill>
+              </a:rPr>
+              <a:t> Background</a:t>
+            </a:r>
+            <a:endParaRPr lang="de-DE" sz="1100" dirty="0">
+              <a:solidFill>
+                <a:schemeClr val="tx1"/>
+              </a:solidFill>
+            </a:endParaRPr>
+          </a:p>
+        </p:txBody>
+      </p:sp>
+      <p:cxnSp>
+        <p:nvCxnSpPr>
+          <p:cNvPr id="8" name="Gerade Verbindung mit Pfeil 7">
+            <a:extLst>
+              <a:ext uri="{FF2B5EF4-FFF2-40B4-BE49-F238E27FC236}">
+                <a16:creationId xmlns:a16="http://schemas.microsoft.com/office/drawing/2014/main" id="{B2544344-ED1E-4291-AE89-A9834B4AA6EB}"/>
+              </a:ext>
+            </a:extLst>
+          </p:cNvPr>
+          <p:cNvCxnSpPr>
+            <a:cxnSpLocks/>
+            <a:stCxn id="4" idx="3"/>
+            <a:endCxn id="6" idx="1"/>
+          </p:cNvCxnSpPr>
+          <p:nvPr/>
+        </p:nvCxnSpPr>
+        <p:spPr>
+          <a:xfrm flipV="1">
+            <a:off x="5830346" y="1687392"/>
+            <a:ext cx="527353" cy="939"/>
+          </a:xfrm>
+          <a:prstGeom prst="straightConnector1">
+            <a:avLst/>
+          </a:prstGeom>
+          <a:ln w="19050">
+            <a:solidFill>
+              <a:schemeClr val="tx1"/>
+            </a:solidFill>
+            <a:tailEnd type="arrow"/>
+          </a:ln>
+        </p:spPr>
+        <p:style>
+          <a:lnRef idx="1">
+            <a:schemeClr val="accent1"/>
+          </a:lnRef>
+          <a:fillRef idx="0">
+            <a:schemeClr val="accent1"/>
+          </a:fillRef>
+          <a:effectRef idx="0">
+            <a:schemeClr val="accent1"/>
+          </a:effectRef>
+          <a:fontRef idx="minor">
+            <a:schemeClr val="tx1"/>
+          </a:fontRef>
+        </p:style>
+      </p:cxnSp>
+      <p:sp>
+        <p:nvSpPr>
+          <p:cNvPr id="10" name="Rechteck 9">
+            <a:extLst>
+              <a:ext uri="{FF2B5EF4-FFF2-40B4-BE49-F238E27FC236}">
+                <a16:creationId xmlns:a16="http://schemas.microsoft.com/office/drawing/2014/main" id="{F4D45E8E-D12F-4387-A9AD-C551B4977E73}"/>
+              </a:ext>
+            </a:extLst>
+          </p:cNvPr>
+          <p:cNvSpPr/>
+          <p:nvPr/>
+        </p:nvSpPr>
+        <p:spPr>
+          <a:xfrm>
+            <a:off x="4937760" y="2477856"/>
+            <a:ext cx="2316480" cy="582932"/>
+          </a:xfrm>
+          <a:prstGeom prst="rect">
+            <a:avLst/>
+          </a:prstGeom>
+          <a:solidFill>
+            <a:schemeClr val="bg1"/>
+          </a:solidFill>
+          <a:ln w="19050">
+            <a:solidFill>
+              <a:schemeClr val="tx1"/>
+            </a:solidFill>
+          </a:ln>
+        </p:spPr>
+        <p:style>
+          <a:lnRef idx="2">
+            <a:schemeClr val="accent1">
+              <a:shade val="50000"/>
+            </a:schemeClr>
+          </a:lnRef>
+          <a:fillRef idx="1">
+            <a:schemeClr val="accent1"/>
+          </a:fillRef>
+          <a:effectRef idx="0">
+            <a:schemeClr val="accent1"/>
+          </a:effectRef>
+          <a:fontRef idx="minor">
+            <a:schemeClr val="lt1"/>
+          </a:fontRef>
+        </p:style>
+        <p:txBody>
+          <a:bodyPr rtlCol="0" anchor="ctr"/>
+          <a:lstStyle/>
+          <a:p>
+            <a:pPr algn="ctr"/>
+            <a:r>
+              <a:rPr lang="de-DE" b="1" dirty="0">
+                <a:solidFill>
+                  <a:schemeClr val="tx1"/>
+                </a:solidFill>
+              </a:rPr>
+              <a:t>3</a:t>
+            </a:r>
+            <a:r>
+              <a:rPr lang="de-DE" dirty="0">
+                <a:solidFill>
+                  <a:schemeClr val="tx1"/>
+                </a:solidFill>
+              </a:rPr>
+              <a:t> Contact </a:t>
+            </a:r>
+            <a:r>
+              <a:rPr lang="de-DE" dirty="0" err="1">
+                <a:solidFill>
+                  <a:schemeClr val="tx1"/>
+                </a:solidFill>
+              </a:rPr>
+              <a:t>Stability</a:t>
+            </a:r>
+            <a:r>
+              <a:rPr lang="de-DE" dirty="0">
+                <a:solidFill>
+                  <a:schemeClr val="tx1"/>
+                </a:solidFill>
+              </a:rPr>
+              <a:t> </a:t>
+            </a:r>
+            <a:r>
+              <a:rPr lang="de-DE" dirty="0" err="1">
+                <a:solidFill>
+                  <a:schemeClr val="tx1"/>
+                </a:solidFill>
+              </a:rPr>
+              <a:t>Constrained</a:t>
+            </a:r>
+            <a:r>
+              <a:rPr lang="de-DE" dirty="0">
+                <a:solidFill>
+                  <a:schemeClr val="tx1"/>
+                </a:solidFill>
+              </a:rPr>
+              <a:t> DDP</a:t>
+            </a:r>
+            <a:endParaRPr lang="de-DE" sz="1100" dirty="0">
+              <a:solidFill>
+                <a:schemeClr val="tx1"/>
+              </a:solidFill>
+            </a:endParaRPr>
+          </a:p>
+        </p:txBody>
+      </p:sp>
+      <p:sp>
+        <p:nvSpPr>
+          <p:cNvPr id="14" name="Rechteck 13">
+            <a:extLst>
+              <a:ext uri="{FF2B5EF4-FFF2-40B4-BE49-F238E27FC236}">
+                <a16:creationId xmlns:a16="http://schemas.microsoft.com/office/drawing/2014/main" id="{714D6279-F38F-41F8-B2D6-D9BC240666C0}"/>
+              </a:ext>
+            </a:extLst>
+          </p:cNvPr>
+          <p:cNvSpPr/>
+          <p:nvPr/>
+        </p:nvSpPr>
+        <p:spPr>
+          <a:xfrm>
+            <a:off x="3947162" y="3545392"/>
+            <a:ext cx="1883186" cy="582932"/>
+          </a:xfrm>
+          <a:prstGeom prst="rect">
+            <a:avLst/>
+          </a:prstGeom>
+          <a:solidFill>
+            <a:schemeClr val="bg1"/>
+          </a:solidFill>
+          <a:ln w="19050">
+            <a:solidFill>
+              <a:schemeClr val="tx1"/>
+            </a:solidFill>
+          </a:ln>
+        </p:spPr>
+        <p:style>
+          <a:lnRef idx="2">
+            <a:schemeClr val="accent1">
+              <a:shade val="50000"/>
+            </a:schemeClr>
+          </a:lnRef>
+          <a:fillRef idx="1">
+            <a:schemeClr val="accent1"/>
+          </a:fillRef>
+          <a:effectRef idx="0">
+            <a:schemeClr val="accent1"/>
+          </a:effectRef>
+          <a:fontRef idx="minor">
+            <a:schemeClr val="lt1"/>
+          </a:fontRef>
+        </p:style>
+        <p:txBody>
+          <a:bodyPr rtlCol="0" anchor="ctr"/>
+          <a:lstStyle/>
+          <a:p>
+            <a:pPr algn="ctr"/>
+            <a:r>
+              <a:rPr lang="de-DE" b="1" dirty="0">
+                <a:solidFill>
+                  <a:schemeClr val="tx1"/>
+                </a:solidFill>
+              </a:rPr>
+              <a:t>4</a:t>
+            </a:r>
+            <a:r>
+              <a:rPr lang="de-DE" dirty="0">
+                <a:solidFill>
+                  <a:schemeClr val="tx1"/>
+                </a:solidFill>
+              </a:rPr>
+              <a:t> </a:t>
+            </a:r>
+            <a:r>
+              <a:rPr lang="de-DE" dirty="0" err="1">
+                <a:solidFill>
+                  <a:schemeClr val="tx1"/>
+                </a:solidFill>
+              </a:rPr>
+              <a:t>Bipedal</a:t>
+            </a:r>
+            <a:r>
+              <a:rPr lang="de-DE" dirty="0">
+                <a:solidFill>
+                  <a:schemeClr val="tx1"/>
+                </a:solidFill>
+              </a:rPr>
+              <a:t> Walking </a:t>
+            </a:r>
+            <a:r>
+              <a:rPr lang="de-DE" dirty="0" err="1">
+                <a:solidFill>
+                  <a:schemeClr val="tx1"/>
+                </a:solidFill>
+              </a:rPr>
+              <a:t>Variants</a:t>
+            </a:r>
+            <a:endParaRPr lang="de-DE" sz="1100" dirty="0">
+              <a:solidFill>
+                <a:schemeClr val="tx1"/>
+              </a:solidFill>
+            </a:endParaRPr>
+          </a:p>
+        </p:txBody>
+      </p:sp>
+      <p:sp>
+        <p:nvSpPr>
+          <p:cNvPr id="16" name="Rechteck 15">
+            <a:extLst>
+              <a:ext uri="{FF2B5EF4-FFF2-40B4-BE49-F238E27FC236}">
+                <a16:creationId xmlns:a16="http://schemas.microsoft.com/office/drawing/2014/main" id="{34C686A2-03E1-406C-B2F9-7D890DC28CC8}"/>
+              </a:ext>
+            </a:extLst>
+          </p:cNvPr>
+          <p:cNvSpPr/>
+          <p:nvPr/>
+        </p:nvSpPr>
+        <p:spPr>
+          <a:xfrm>
+            <a:off x="6357699" y="3545392"/>
+            <a:ext cx="1883183" cy="582932"/>
+          </a:xfrm>
+          <a:prstGeom prst="rect">
+            <a:avLst/>
+          </a:prstGeom>
+          <a:solidFill>
+            <a:schemeClr val="bg1"/>
+          </a:solidFill>
+          <a:ln w="19050">
+            <a:solidFill>
+              <a:schemeClr val="tx1"/>
+            </a:solidFill>
+          </a:ln>
+        </p:spPr>
+        <p:style>
+          <a:lnRef idx="2">
+            <a:schemeClr val="accent1">
+              <a:shade val="50000"/>
+            </a:schemeClr>
+          </a:lnRef>
+          <a:fillRef idx="1">
+            <a:schemeClr val="accent1"/>
+          </a:fillRef>
+          <a:effectRef idx="0">
+            <a:schemeClr val="accent1"/>
+          </a:effectRef>
+          <a:fontRef idx="minor">
+            <a:schemeClr val="lt1"/>
+          </a:fontRef>
+        </p:style>
+        <p:txBody>
+          <a:bodyPr rtlCol="0" anchor="ctr"/>
+          <a:lstStyle/>
+          <a:p>
+            <a:pPr algn="ctr"/>
+            <a:r>
+              <a:rPr lang="de-DE" b="1" dirty="0">
+                <a:solidFill>
+                  <a:schemeClr val="tx1"/>
+                </a:solidFill>
+              </a:rPr>
+              <a:t>5</a:t>
+            </a:r>
+            <a:r>
+              <a:rPr lang="de-DE" dirty="0">
+                <a:solidFill>
+                  <a:schemeClr val="tx1"/>
+                </a:solidFill>
+              </a:rPr>
+              <a:t> </a:t>
+            </a:r>
+            <a:r>
+              <a:rPr lang="de-DE" dirty="0" err="1">
+                <a:solidFill>
+                  <a:schemeClr val="tx1"/>
+                </a:solidFill>
+              </a:rPr>
+              <a:t>Highly</a:t>
+            </a:r>
+            <a:r>
+              <a:rPr lang="de-DE" dirty="0">
+                <a:solidFill>
+                  <a:schemeClr val="tx1"/>
+                </a:solidFill>
+              </a:rPr>
+              <a:t> Dynamic </a:t>
+            </a:r>
+            <a:r>
+              <a:rPr lang="de-DE" dirty="0" err="1">
+                <a:solidFill>
+                  <a:schemeClr val="tx1"/>
+                </a:solidFill>
+              </a:rPr>
+              <a:t>Movements</a:t>
+            </a:r>
+            <a:endParaRPr lang="de-DE" sz="1100" dirty="0">
+              <a:solidFill>
+                <a:schemeClr val="tx1"/>
+              </a:solidFill>
+            </a:endParaRPr>
+          </a:p>
+        </p:txBody>
+      </p:sp>
+      <p:sp>
+        <p:nvSpPr>
+          <p:cNvPr id="18" name="Rechteck 17">
+            <a:extLst>
+              <a:ext uri="{FF2B5EF4-FFF2-40B4-BE49-F238E27FC236}">
+                <a16:creationId xmlns:a16="http://schemas.microsoft.com/office/drawing/2014/main" id="{9B5664D5-C88B-4A49-B931-1902D6656029}"/>
+              </a:ext>
+            </a:extLst>
+          </p:cNvPr>
+          <p:cNvSpPr/>
+          <p:nvPr/>
+        </p:nvSpPr>
+        <p:spPr>
+          <a:xfrm>
+            <a:off x="4647247" y="4616926"/>
+            <a:ext cx="2897505" cy="582932"/>
+          </a:xfrm>
+          <a:prstGeom prst="rect">
+            <a:avLst/>
+          </a:prstGeom>
+          <a:solidFill>
+            <a:schemeClr val="bg1"/>
+          </a:solidFill>
+          <a:ln w="19050">
+            <a:solidFill>
+              <a:schemeClr val="tx1"/>
+            </a:solidFill>
+          </a:ln>
+        </p:spPr>
+        <p:style>
+          <a:lnRef idx="2">
+            <a:schemeClr val="accent1">
+              <a:shade val="50000"/>
+            </a:schemeClr>
+          </a:lnRef>
+          <a:fillRef idx="1">
+            <a:schemeClr val="accent1"/>
+          </a:fillRef>
+          <a:effectRef idx="0">
+            <a:schemeClr val="accent1"/>
+          </a:effectRef>
+          <a:fontRef idx="minor">
+            <a:schemeClr val="lt1"/>
+          </a:fontRef>
+        </p:style>
+        <p:txBody>
+          <a:bodyPr rtlCol="0" anchor="ctr"/>
+          <a:lstStyle/>
+          <a:p>
+            <a:pPr algn="ctr"/>
+            <a:r>
+              <a:rPr lang="de-DE" b="1" dirty="0">
+                <a:solidFill>
+                  <a:schemeClr val="tx1"/>
+                </a:solidFill>
+              </a:rPr>
+              <a:t>6</a:t>
+            </a:r>
+            <a:r>
+              <a:rPr lang="de-DE" dirty="0">
+                <a:solidFill>
+                  <a:schemeClr val="tx1"/>
+                </a:solidFill>
+              </a:rPr>
+              <a:t> Validation </a:t>
+            </a:r>
+            <a:r>
+              <a:rPr lang="de-DE" dirty="0" err="1">
+                <a:solidFill>
+                  <a:schemeClr val="tx1"/>
+                </a:solidFill>
+              </a:rPr>
+              <a:t>of</a:t>
+            </a:r>
+            <a:r>
+              <a:rPr lang="de-DE" dirty="0">
+                <a:solidFill>
+                  <a:schemeClr val="tx1"/>
+                </a:solidFill>
+              </a:rPr>
+              <a:t> </a:t>
+            </a:r>
+            <a:r>
+              <a:rPr lang="de-DE" dirty="0" err="1">
+                <a:solidFill>
+                  <a:schemeClr val="tx1"/>
+                </a:solidFill>
+              </a:rPr>
+              <a:t>Planned</a:t>
+            </a:r>
+            <a:r>
+              <a:rPr lang="de-DE" dirty="0">
+                <a:solidFill>
+                  <a:schemeClr val="tx1"/>
+                </a:solidFill>
+              </a:rPr>
+              <a:t> </a:t>
+            </a:r>
+            <a:r>
+              <a:rPr lang="de-DE" dirty="0" err="1">
+                <a:solidFill>
+                  <a:schemeClr val="tx1"/>
+                </a:solidFill>
+              </a:rPr>
+              <a:t>Motions</a:t>
+            </a:r>
+            <a:endParaRPr lang="de-DE" sz="1100" dirty="0">
+              <a:solidFill>
+                <a:schemeClr val="tx1"/>
+              </a:solidFill>
+            </a:endParaRPr>
+          </a:p>
+        </p:txBody>
+      </p:sp>
+      <p:cxnSp>
+        <p:nvCxnSpPr>
+          <p:cNvPr id="24" name="Gerade Verbindung mit Pfeil 23">
+            <a:extLst>
+              <a:ext uri="{FF2B5EF4-FFF2-40B4-BE49-F238E27FC236}">
+                <a16:creationId xmlns:a16="http://schemas.microsoft.com/office/drawing/2014/main" id="{9D0F6451-1784-45C3-8DC4-7015B41D92BF}"/>
+              </a:ext>
+            </a:extLst>
+          </p:cNvPr>
+          <p:cNvCxnSpPr>
+            <a:cxnSpLocks/>
+          </p:cNvCxnSpPr>
+          <p:nvPr/>
+        </p:nvCxnSpPr>
+        <p:spPr>
+          <a:xfrm>
+            <a:off x="7369969" y="2100598"/>
+            <a:ext cx="0" cy="280035"/>
+          </a:xfrm>
+          <a:prstGeom prst="straightConnector1">
+            <a:avLst/>
+          </a:prstGeom>
+          <a:ln w="19050">
+            <a:solidFill>
+              <a:schemeClr val="tx1"/>
+            </a:solidFill>
+            <a:tailEnd type="arrow"/>
+          </a:ln>
+        </p:spPr>
+        <p:style>
+          <a:lnRef idx="1">
+            <a:schemeClr val="accent1"/>
+          </a:lnRef>
+          <a:fillRef idx="0">
+            <a:schemeClr val="accent1"/>
+          </a:fillRef>
+          <a:effectRef idx="0">
+            <a:schemeClr val="accent1"/>
+          </a:effectRef>
+          <a:fontRef idx="minor">
+            <a:schemeClr val="tx1"/>
+          </a:fontRef>
+        </p:style>
+      </p:cxnSp>
+      <p:cxnSp>
+        <p:nvCxnSpPr>
+          <p:cNvPr id="28" name="Gerade Verbindung mit Pfeil 27">
+            <a:extLst>
+              <a:ext uri="{FF2B5EF4-FFF2-40B4-BE49-F238E27FC236}">
+                <a16:creationId xmlns:a16="http://schemas.microsoft.com/office/drawing/2014/main" id="{206FD2DB-E182-401C-88C8-DDD72A14BA5E}"/>
+              </a:ext>
+            </a:extLst>
+          </p:cNvPr>
+          <p:cNvCxnSpPr>
+            <a:cxnSpLocks/>
+          </p:cNvCxnSpPr>
+          <p:nvPr/>
+        </p:nvCxnSpPr>
+        <p:spPr>
+          <a:xfrm>
+            <a:off x="6096000" y="5306538"/>
+            <a:ext cx="0" cy="266080"/>
+          </a:xfrm>
+          <a:prstGeom prst="straightConnector1">
+            <a:avLst/>
+          </a:prstGeom>
+          <a:ln w="19050">
+            <a:solidFill>
+              <a:schemeClr val="tx1"/>
+            </a:solidFill>
+            <a:tailEnd type="arrow"/>
+          </a:ln>
+        </p:spPr>
+        <p:style>
+          <a:lnRef idx="1">
+            <a:schemeClr val="accent1"/>
+          </a:lnRef>
+          <a:fillRef idx="0">
+            <a:schemeClr val="accent1"/>
+          </a:fillRef>
+          <a:effectRef idx="0">
+            <a:schemeClr val="accent1"/>
+          </a:effectRef>
+          <a:fontRef idx="minor">
+            <a:schemeClr val="tx1"/>
+          </a:fontRef>
+        </p:style>
+      </p:cxnSp>
+      <p:cxnSp>
+        <p:nvCxnSpPr>
+          <p:cNvPr id="30" name="Gerade Verbindung mit Pfeil 29">
+            <a:extLst>
+              <a:ext uri="{FF2B5EF4-FFF2-40B4-BE49-F238E27FC236}">
+                <a16:creationId xmlns:a16="http://schemas.microsoft.com/office/drawing/2014/main" id="{B0D025E9-17F7-4334-ACE8-632D2456FC1E}"/>
+              </a:ext>
+            </a:extLst>
+          </p:cNvPr>
+          <p:cNvCxnSpPr>
+            <a:cxnSpLocks/>
+          </p:cNvCxnSpPr>
+          <p:nvPr/>
+        </p:nvCxnSpPr>
+        <p:spPr>
+          <a:xfrm>
+            <a:off x="7369969" y="4235118"/>
+            <a:ext cx="0" cy="275129"/>
+          </a:xfrm>
+          <a:prstGeom prst="straightConnector1">
+            <a:avLst/>
+          </a:prstGeom>
+          <a:ln w="19050">
+            <a:solidFill>
+              <a:schemeClr val="tx1"/>
+            </a:solidFill>
+            <a:tailEnd type="arrow"/>
+          </a:ln>
+        </p:spPr>
+        <p:style>
+          <a:lnRef idx="1">
+            <a:schemeClr val="accent1"/>
+          </a:lnRef>
+          <a:fillRef idx="0">
+            <a:schemeClr val="accent1"/>
+          </a:fillRef>
+          <a:effectRef idx="0">
+            <a:schemeClr val="accent1"/>
+          </a:effectRef>
+          <a:fontRef idx="minor">
+            <a:schemeClr val="tx1"/>
+          </a:fontRef>
+        </p:style>
+      </p:cxnSp>
+      <p:cxnSp>
+        <p:nvCxnSpPr>
+          <p:cNvPr id="32" name="Gerade Verbindung mit Pfeil 31">
+            <a:extLst>
+              <a:ext uri="{FF2B5EF4-FFF2-40B4-BE49-F238E27FC236}">
+                <a16:creationId xmlns:a16="http://schemas.microsoft.com/office/drawing/2014/main" id="{53DC722D-1F83-46B6-B0C6-ACDD09B298A8}"/>
+              </a:ext>
+            </a:extLst>
+          </p:cNvPr>
+          <p:cNvCxnSpPr>
+            <a:cxnSpLocks/>
+          </p:cNvCxnSpPr>
+          <p:nvPr/>
+        </p:nvCxnSpPr>
+        <p:spPr>
+          <a:xfrm>
+            <a:off x="4798282" y="4244167"/>
+            <a:ext cx="0" cy="266080"/>
+          </a:xfrm>
+          <a:prstGeom prst="straightConnector1">
+            <a:avLst/>
+          </a:prstGeom>
+          <a:ln w="19050">
+            <a:solidFill>
+              <a:schemeClr val="tx1"/>
+            </a:solidFill>
+            <a:tailEnd type="arrow"/>
+          </a:ln>
+        </p:spPr>
+        <p:style>
+          <a:lnRef idx="1">
+            <a:schemeClr val="accent1"/>
+          </a:lnRef>
+          <a:fillRef idx="0">
+            <a:schemeClr val="accent1"/>
+          </a:fillRef>
+          <a:effectRef idx="0">
+            <a:schemeClr val="accent1"/>
+          </a:effectRef>
+          <a:fontRef idx="minor">
+            <a:schemeClr val="tx1"/>
+          </a:fontRef>
+        </p:style>
+      </p:cxnSp>
+      <p:cxnSp>
+        <p:nvCxnSpPr>
+          <p:cNvPr id="34" name="Gerade Verbindung mit Pfeil 33">
+            <a:extLst>
+              <a:ext uri="{FF2B5EF4-FFF2-40B4-BE49-F238E27FC236}">
+                <a16:creationId xmlns:a16="http://schemas.microsoft.com/office/drawing/2014/main" id="{C15B0359-4BC0-448C-84AD-6408F3ACDC0F}"/>
+              </a:ext>
+            </a:extLst>
+          </p:cNvPr>
+          <p:cNvCxnSpPr>
+            <a:cxnSpLocks/>
+          </p:cNvCxnSpPr>
+          <p:nvPr/>
+        </p:nvCxnSpPr>
+        <p:spPr>
+          <a:xfrm>
+            <a:off x="7369969" y="3181543"/>
+            <a:ext cx="1" cy="257170"/>
+          </a:xfrm>
+          <a:prstGeom prst="straightConnector1">
+            <a:avLst/>
+          </a:prstGeom>
+          <a:ln w="19050">
+            <a:solidFill>
+              <a:schemeClr val="tx1"/>
+            </a:solidFill>
+            <a:tailEnd type="arrow"/>
+          </a:ln>
+        </p:spPr>
+        <p:style>
+          <a:lnRef idx="1">
+            <a:schemeClr val="accent1"/>
+          </a:lnRef>
+          <a:fillRef idx="0">
+            <a:schemeClr val="accent1"/>
+          </a:fillRef>
+          <a:effectRef idx="0">
+            <a:schemeClr val="accent1"/>
+          </a:effectRef>
+          <a:fontRef idx="minor">
+            <a:schemeClr val="tx1"/>
+          </a:fontRef>
+        </p:style>
+      </p:cxnSp>
+      <p:cxnSp>
+        <p:nvCxnSpPr>
+          <p:cNvPr id="36" name="Gerade Verbindung mit Pfeil 35">
+            <a:extLst>
+              <a:ext uri="{FF2B5EF4-FFF2-40B4-BE49-F238E27FC236}">
+                <a16:creationId xmlns:a16="http://schemas.microsoft.com/office/drawing/2014/main" id="{25783B4C-7760-48B4-9BDC-6DFC8423E726}"/>
+              </a:ext>
+            </a:extLst>
+          </p:cNvPr>
+          <p:cNvCxnSpPr>
+            <a:cxnSpLocks/>
+          </p:cNvCxnSpPr>
+          <p:nvPr/>
+        </p:nvCxnSpPr>
+        <p:spPr>
+          <a:xfrm>
+            <a:off x="4801639" y="3181543"/>
+            <a:ext cx="0" cy="264797"/>
+          </a:xfrm>
+          <a:prstGeom prst="straightConnector1">
+            <a:avLst/>
+          </a:prstGeom>
+          <a:ln w="19050">
+            <a:solidFill>
+              <a:schemeClr val="tx1"/>
+            </a:solidFill>
+            <a:tailEnd type="arrow"/>
+          </a:ln>
+        </p:spPr>
+        <p:style>
+          <a:lnRef idx="1">
+            <a:schemeClr val="accent1"/>
+          </a:lnRef>
+          <a:fillRef idx="0">
+            <a:schemeClr val="accent1"/>
+          </a:fillRef>
+          <a:effectRef idx="0">
+            <a:schemeClr val="accent1"/>
+          </a:effectRef>
+          <a:fontRef idx="minor">
+            <a:schemeClr val="tx1"/>
+          </a:fontRef>
+        </p:style>
+      </p:cxnSp>
+      <p:sp>
+        <p:nvSpPr>
+          <p:cNvPr id="104" name="Rechteck 103">
+            <a:extLst>
+              <a:ext uri="{FF2B5EF4-FFF2-40B4-BE49-F238E27FC236}">
+                <a16:creationId xmlns:a16="http://schemas.microsoft.com/office/drawing/2014/main" id="{9A7C9294-10B6-4736-AD68-B36FCAF45476}"/>
+              </a:ext>
+            </a:extLst>
+          </p:cNvPr>
+          <p:cNvSpPr/>
+          <p:nvPr/>
+        </p:nvSpPr>
+        <p:spPr>
+          <a:xfrm>
+            <a:off x="5074183" y="5676516"/>
+            <a:ext cx="1883183" cy="581993"/>
+          </a:xfrm>
+          <a:prstGeom prst="rect">
+            <a:avLst/>
+          </a:prstGeom>
+          <a:solidFill>
+            <a:schemeClr val="bg1"/>
+          </a:solidFill>
+          <a:ln w="19050">
+            <a:solidFill>
+              <a:schemeClr val="tx1"/>
+            </a:solidFill>
+          </a:ln>
+        </p:spPr>
+        <p:style>
+          <a:lnRef idx="2">
+            <a:schemeClr val="accent1">
+              <a:shade val="50000"/>
+            </a:schemeClr>
+          </a:lnRef>
+          <a:fillRef idx="1">
+            <a:schemeClr val="accent1"/>
+          </a:fillRef>
+          <a:effectRef idx="0">
+            <a:schemeClr val="accent1"/>
+          </a:effectRef>
+          <a:fontRef idx="minor">
+            <a:schemeClr val="lt1"/>
+          </a:fontRef>
+        </p:style>
+        <p:txBody>
+          <a:bodyPr rtlCol="0" anchor="ctr"/>
+          <a:lstStyle/>
+          <a:p>
+            <a:pPr algn="ctr"/>
+            <a:r>
+              <a:rPr lang="de-DE" b="1" dirty="0">
+                <a:solidFill>
+                  <a:schemeClr val="tx1"/>
+                </a:solidFill>
+              </a:rPr>
+              <a:t>7 </a:t>
+            </a:r>
+            <a:r>
+              <a:rPr lang="de-DE" dirty="0" err="1">
+                <a:solidFill>
+                  <a:schemeClr val="tx1"/>
+                </a:solidFill>
+              </a:rPr>
+              <a:t>Conclusion</a:t>
+            </a:r>
+            <a:endParaRPr lang="de-DE" dirty="0">
+              <a:solidFill>
+                <a:schemeClr val="tx1"/>
+              </a:solidFill>
+            </a:endParaRPr>
+          </a:p>
+        </p:txBody>
+      </p:sp>
+      <p:cxnSp>
+        <p:nvCxnSpPr>
+          <p:cNvPr id="38" name="Gerade Verbindung mit Pfeil 37">
+            <a:extLst>
+              <a:ext uri="{FF2B5EF4-FFF2-40B4-BE49-F238E27FC236}">
+                <a16:creationId xmlns:a16="http://schemas.microsoft.com/office/drawing/2014/main" id="{EECD36D5-5FC7-4897-A323-3281EDB92929}"/>
+              </a:ext>
+            </a:extLst>
+          </p:cNvPr>
+          <p:cNvCxnSpPr>
+            <a:cxnSpLocks/>
+          </p:cNvCxnSpPr>
+          <p:nvPr/>
+        </p:nvCxnSpPr>
+        <p:spPr>
+          <a:xfrm flipH="1">
+            <a:off x="4821773" y="2091142"/>
+            <a:ext cx="1" cy="280035"/>
+          </a:xfrm>
+          <a:prstGeom prst="straightConnector1">
+            <a:avLst/>
+          </a:prstGeom>
+          <a:ln w="19050">
+            <a:solidFill>
+              <a:schemeClr val="tx1"/>
+            </a:solidFill>
+            <a:tailEnd type="arrow"/>
+          </a:ln>
+        </p:spPr>
+        <p:style>
+          <a:lnRef idx="1">
+            <a:schemeClr val="accent1"/>
+          </a:lnRef>
+          <a:fillRef idx="0">
+            <a:schemeClr val="accent1"/>
+          </a:fillRef>
+          <a:effectRef idx="0">
+            <a:schemeClr val="accent1"/>
+          </a:effectRef>
+          <a:fontRef idx="minor">
+            <a:schemeClr val="tx1"/>
+          </a:fontRef>
+        </p:style>
+      </p:cxnSp>
+      <p:cxnSp>
+        <p:nvCxnSpPr>
+          <p:cNvPr id="12" name="Gerade Verbindung mit Pfeil 11">
+            <a:extLst>
+              <a:ext uri="{FF2B5EF4-FFF2-40B4-BE49-F238E27FC236}">
+                <a16:creationId xmlns:a16="http://schemas.microsoft.com/office/drawing/2014/main" id="{B33D3872-9D5E-4FDC-9AB1-DB08D72AE104}"/>
+              </a:ext>
+            </a:extLst>
+          </p:cNvPr>
+          <p:cNvCxnSpPr>
+            <a:cxnSpLocks/>
+            <a:stCxn id="14" idx="3"/>
+            <a:endCxn id="16" idx="1"/>
+          </p:cNvCxnSpPr>
+          <p:nvPr/>
+        </p:nvCxnSpPr>
+        <p:spPr>
+          <a:xfrm>
+            <a:off x="5830348" y="3836858"/>
+            <a:ext cx="527351" cy="0"/>
+          </a:xfrm>
+          <a:prstGeom prst="straightConnector1">
+            <a:avLst/>
+          </a:prstGeom>
+          <a:ln w="19050">
+            <a:solidFill>
+              <a:schemeClr val="tx1"/>
+            </a:solidFill>
+            <a:tailEnd type="arrow"/>
+          </a:ln>
+        </p:spPr>
+        <p:style>
+          <a:lnRef idx="1">
+            <a:schemeClr val="accent1"/>
+          </a:lnRef>
+          <a:fillRef idx="0">
+            <a:schemeClr val="accent1"/>
+          </a:fillRef>
+          <a:effectRef idx="0">
+            <a:schemeClr val="accent1"/>
+          </a:effectRef>
+          <a:fontRef idx="minor">
+            <a:schemeClr val="tx1"/>
+          </a:fontRef>
+        </p:style>
+      </p:cxnSp>
+      <p:sp>
+        <p:nvSpPr>
+          <p:cNvPr id="26" name="Rechteck 25">
+            <a:extLst>
+              <a:ext uri="{FF2B5EF4-FFF2-40B4-BE49-F238E27FC236}">
+                <a16:creationId xmlns:a16="http://schemas.microsoft.com/office/drawing/2014/main" id="{6D70A845-5B55-402B-A6DD-7679D24C01D3}"/>
+              </a:ext>
+            </a:extLst>
+          </p:cNvPr>
+          <p:cNvSpPr/>
+          <p:nvPr/>
+        </p:nvSpPr>
+        <p:spPr>
+          <a:xfrm>
+            <a:off x="8891796" y="2480310"/>
+            <a:ext cx="2072613" cy="582932"/>
+          </a:xfrm>
+          <a:prstGeom prst="rect">
+            <a:avLst/>
+          </a:prstGeom>
+          <a:solidFill>
+            <a:schemeClr val="bg1"/>
+          </a:solidFill>
+          <a:ln w="19050">
+            <a:solidFill>
+              <a:schemeClr val="tx1"/>
+            </a:solidFill>
+          </a:ln>
+        </p:spPr>
+        <p:style>
+          <a:lnRef idx="2">
+            <a:schemeClr val="accent1">
+              <a:shade val="50000"/>
+            </a:schemeClr>
+          </a:lnRef>
+          <a:fillRef idx="1">
+            <a:schemeClr val="accent1"/>
+          </a:fillRef>
+          <a:effectRef idx="0">
+            <a:schemeClr val="accent1"/>
+          </a:effectRef>
+          <a:fontRef idx="minor">
+            <a:schemeClr val="lt1"/>
+          </a:fontRef>
+        </p:style>
+        <p:txBody>
+          <a:bodyPr rtlCol="0" anchor="ctr"/>
+          <a:lstStyle/>
+          <a:p>
+            <a:pPr algn="ctr"/>
+            <a:r>
+              <a:rPr lang="de-DE" b="1" dirty="0">
+                <a:solidFill>
+                  <a:schemeClr val="tx1"/>
+                </a:solidFill>
+              </a:rPr>
+              <a:t>A1, A2 </a:t>
+            </a:r>
+            <a:r>
+              <a:rPr lang="de-DE" dirty="0">
+                <a:solidFill>
+                  <a:schemeClr val="tx1"/>
+                </a:solidFill>
+              </a:rPr>
+              <a:t>Open-Source </a:t>
+            </a:r>
+            <a:r>
+              <a:rPr lang="de-DE" dirty="0" err="1">
+                <a:solidFill>
+                  <a:schemeClr val="tx1"/>
+                </a:solidFill>
+              </a:rPr>
+              <a:t>Contributions</a:t>
+            </a:r>
+            <a:endParaRPr lang="de-DE" sz="1100" dirty="0">
+              <a:solidFill>
+                <a:schemeClr val="tx1"/>
+              </a:solidFill>
+            </a:endParaRPr>
+          </a:p>
+        </p:txBody>
+      </p:sp>
+      <p:sp>
+        <p:nvSpPr>
+          <p:cNvPr id="29" name="Rechteck 28">
+            <a:extLst>
+              <a:ext uri="{FF2B5EF4-FFF2-40B4-BE49-F238E27FC236}">
+                <a16:creationId xmlns:a16="http://schemas.microsoft.com/office/drawing/2014/main" id="{ABD02D76-D0F4-48E3-81E5-9FAFF5912B64}"/>
+              </a:ext>
+            </a:extLst>
+          </p:cNvPr>
+          <p:cNvSpPr/>
+          <p:nvPr/>
+        </p:nvSpPr>
+        <p:spPr>
+          <a:xfrm>
+            <a:off x="8891796" y="4611518"/>
+            <a:ext cx="2072613" cy="582932"/>
+          </a:xfrm>
+          <a:prstGeom prst="rect">
+            <a:avLst/>
+          </a:prstGeom>
+          <a:solidFill>
+            <a:schemeClr val="bg1"/>
+          </a:solidFill>
+          <a:ln w="19050">
+            <a:solidFill>
+              <a:schemeClr val="tx1"/>
+            </a:solidFill>
+          </a:ln>
+        </p:spPr>
+        <p:style>
+          <a:lnRef idx="2">
+            <a:schemeClr val="accent1">
+              <a:shade val="50000"/>
+            </a:schemeClr>
+          </a:lnRef>
+          <a:fillRef idx="1">
+            <a:schemeClr val="accent1"/>
+          </a:fillRef>
+          <a:effectRef idx="0">
+            <a:schemeClr val="accent1"/>
+          </a:effectRef>
+          <a:fontRef idx="minor">
+            <a:schemeClr val="lt1"/>
+          </a:fontRef>
+        </p:style>
+        <p:txBody>
+          <a:bodyPr rtlCol="0" anchor="ctr"/>
+          <a:lstStyle/>
+          <a:p>
+            <a:pPr algn="ctr"/>
+            <a:r>
+              <a:rPr lang="de-DE" b="1" dirty="0">
+                <a:solidFill>
+                  <a:schemeClr val="tx1"/>
+                </a:solidFill>
+              </a:rPr>
+              <a:t>A3 </a:t>
+            </a:r>
+            <a:r>
+              <a:rPr lang="de-DE" dirty="0">
+                <a:solidFill>
+                  <a:schemeClr val="tx1"/>
+                </a:solidFill>
+              </a:rPr>
+              <a:t>Framework Consistency</a:t>
+            </a:r>
+            <a:endParaRPr lang="de-DE" sz="1100" dirty="0">
+              <a:solidFill>
+                <a:schemeClr val="tx1"/>
+              </a:solidFill>
+            </a:endParaRPr>
+          </a:p>
+        </p:txBody>
+      </p:sp>
+      <p:cxnSp>
+        <p:nvCxnSpPr>
+          <p:cNvPr id="31" name="Gerade Verbindung mit Pfeil 30">
+            <a:extLst>
+              <a:ext uri="{FF2B5EF4-FFF2-40B4-BE49-F238E27FC236}">
+                <a16:creationId xmlns:a16="http://schemas.microsoft.com/office/drawing/2014/main" id="{D6181618-E9B6-4317-9E10-BEAB318891CD}"/>
+              </a:ext>
+            </a:extLst>
+          </p:cNvPr>
+          <p:cNvCxnSpPr>
+            <a:cxnSpLocks/>
+            <a:endCxn id="125" idx="3"/>
+          </p:cNvCxnSpPr>
+          <p:nvPr/>
+        </p:nvCxnSpPr>
+        <p:spPr>
+          <a:xfrm flipH="1">
+            <a:off x="8382000" y="4902984"/>
+            <a:ext cx="396951" cy="5409"/>
+          </a:xfrm>
+          <a:prstGeom prst="straightConnector1">
+            <a:avLst/>
+          </a:prstGeom>
+          <a:ln w="19050">
+            <a:solidFill>
+              <a:schemeClr val="tx1"/>
+            </a:solidFill>
+            <a:tailEnd type="arrow"/>
+          </a:ln>
+        </p:spPr>
+        <p:style>
+          <a:lnRef idx="1">
+            <a:schemeClr val="accent1"/>
+          </a:lnRef>
+          <a:fillRef idx="0">
+            <a:schemeClr val="accent1"/>
+          </a:fillRef>
+          <a:effectRef idx="0">
+            <a:schemeClr val="accent1"/>
+          </a:effectRef>
+          <a:fontRef idx="minor">
+            <a:schemeClr val="tx1"/>
+          </a:fontRef>
+        </p:style>
+      </p:cxnSp>
+      <p:cxnSp>
+        <p:nvCxnSpPr>
+          <p:cNvPr id="43" name="Gerade Verbindung mit Pfeil 42">
+            <a:extLst>
+              <a:ext uri="{FF2B5EF4-FFF2-40B4-BE49-F238E27FC236}">
+                <a16:creationId xmlns:a16="http://schemas.microsoft.com/office/drawing/2014/main" id="{398600D3-B40D-4DB2-961B-7FD2748DDCA4}"/>
+              </a:ext>
+            </a:extLst>
+          </p:cNvPr>
+          <p:cNvCxnSpPr>
+            <a:cxnSpLocks/>
+            <a:endCxn id="127" idx="3"/>
+          </p:cNvCxnSpPr>
+          <p:nvPr/>
+        </p:nvCxnSpPr>
+        <p:spPr>
+          <a:xfrm flipH="1">
+            <a:off x="8382000" y="2769323"/>
+            <a:ext cx="396951" cy="0"/>
+          </a:xfrm>
+          <a:prstGeom prst="straightConnector1">
+            <a:avLst/>
+          </a:prstGeom>
+          <a:ln w="19050">
+            <a:solidFill>
+              <a:schemeClr val="tx1"/>
+            </a:solidFill>
+            <a:tailEnd type="arrow"/>
+          </a:ln>
+        </p:spPr>
+        <p:style>
+          <a:lnRef idx="1">
+            <a:schemeClr val="accent1"/>
+          </a:lnRef>
+          <a:fillRef idx="0">
+            <a:schemeClr val="accent1"/>
+          </a:fillRef>
+          <a:effectRef idx="0">
+            <a:schemeClr val="accent1"/>
+          </a:effectRef>
+          <a:fontRef idx="minor">
+            <a:schemeClr val="tx1"/>
+          </a:fontRef>
+        </p:style>
+      </p:cxnSp>
+    </p:spTree>
+    <p:extLst>
+      <p:ext uri="{BB962C8B-B14F-4D97-AF65-F5344CB8AC3E}">
+        <p14:creationId xmlns:p14="http://schemas.microsoft.com/office/powerpoint/2010/main" val="3938771773"/>
       </p:ext>
     </p:extLst>
   </p:cSld>

</xml_diff>